<commit_message>
Updated density part of ppt
According to order that showed in slide 5, I added my part between
Nick's and Eric's.
</commit_message>
<xml_diff>
--- a/Implementation/Implementation Team Presentation.pptx
+++ b/Implementation/Implementation Team Presentation.pptx
@@ -13,10 +13,12 @@
     <p:sldId id="265" r:id="rId7"/>
     <p:sldId id="266" r:id="rId8"/>
     <p:sldId id="267" r:id="rId9"/>
-    <p:sldId id="262" r:id="rId10"/>
-    <p:sldId id="261" r:id="rId11"/>
-    <p:sldId id="263" r:id="rId12"/>
-    <p:sldId id="264" r:id="rId13"/>
+    <p:sldId id="268" r:id="rId10"/>
+    <p:sldId id="269" r:id="rId11"/>
+    <p:sldId id="262" r:id="rId12"/>
+    <p:sldId id="261" r:id="rId13"/>
+    <p:sldId id="263" r:id="rId14"/>
+    <p:sldId id="264" r:id="rId15"/>
   </p:sldIdLst>
   <p:sldSz cx="12192000" cy="6858000"/>
   <p:notesSz cx="6858000" cy="9144000"/>
@@ -117,7 +119,7 @@
   </p:defaultTextStyle>
   <p:extLst>
     <p:ext uri="{EFAFB233-063F-42B5-8137-9DF3F51BA10A}">
-      <p15:sldGuideLst xmlns:p15="http://schemas.microsoft.com/office/powerpoint/2012/main" xmlns="">
+      <p15:sldGuideLst xmlns:p15="http://schemas.microsoft.com/office/powerpoint/2012/main">
         <p15:guide id="1" orient="horz" pos="2160">
           <p15:clr>
             <a:srgbClr val="A4A3A4"/>
@@ -361,7 +363,7 @@
             <a:fld id="{4BDF68E2-58F2-4D09-BE8B-E3BD06533059}" type="datetimeFigureOut">
               <a:rPr lang="en-US" dirty="0"/>
               <a:pPr/>
-              <a:t>11/16/2014</a:t>
+              <a:t>11/15/2014</a:t>
             </a:fld>
             <a:endParaRPr lang="en-US" dirty="0"/>
           </a:p>
@@ -566,7 +568,7 @@
             <a:fld id="{2E2D6473-DF6D-4702-B328-E0DD40540A4E}" type="datetimeFigureOut">
               <a:rPr lang="en-US" dirty="0"/>
               <a:pPr/>
-              <a:t>11/16/2014</a:t>
+              <a:t>11/15/2014</a:t>
             </a:fld>
             <a:endParaRPr lang="en-US" dirty="0"/>
           </a:p>
@@ -819,7 +821,7 @@
             <a:fld id="{E26F7E3A-B166-407D-9866-32884E7D5B37}" type="datetimeFigureOut">
               <a:rPr lang="en-US" dirty="0"/>
               <a:pPr/>
-              <a:t>11/16/2014</a:t>
+              <a:t>11/15/2014</a:t>
             </a:fld>
             <a:endParaRPr lang="en-US" dirty="0"/>
           </a:p>
@@ -990,7 +992,7 @@
             <a:fld id="{528FC5F6-F338-4AE4-BB23-26385BCFC423}" type="datetimeFigureOut">
               <a:rPr lang="en-US" dirty="0"/>
               <a:pPr/>
-              <a:t>11/16/2014</a:t>
+              <a:t>11/15/2014</a:t>
             </a:fld>
             <a:endParaRPr lang="en-US" dirty="0"/>
           </a:p>
@@ -1330,7 +1332,7 @@
             <a:fld id="{20EBB0C4-6273-4C6E-B9BD-2EDC30F1CD52}" type="datetimeFigureOut">
               <a:rPr lang="en-US" dirty="0"/>
               <a:pPr/>
-              <a:t>11/16/2014</a:t>
+              <a:t>11/15/2014</a:t>
             </a:fld>
             <a:endParaRPr lang="en-US" dirty="0"/>
           </a:p>
@@ -1602,7 +1604,7 @@
             <a:fld id="{19AB4D41-86C1-4908-B66A-0B50CEB3BF29}" type="datetimeFigureOut">
               <a:rPr lang="en-US" dirty="0"/>
               <a:pPr/>
-              <a:t>11/16/2014</a:t>
+              <a:t>11/15/2014</a:t>
             </a:fld>
             <a:endParaRPr lang="en-US" dirty="0"/>
           </a:p>
@@ -1978,7 +1980,7 @@
             <a:fld id="{E6426E2C-56C1-4E0D-A793-0088A7FDD37E}" type="datetimeFigureOut">
               <a:rPr lang="en-US" dirty="0"/>
               <a:pPr/>
-              <a:t>11/16/2014</a:t>
+              <a:t>11/15/2014</a:t>
             </a:fld>
             <a:endParaRPr lang="en-US" dirty="0"/>
           </a:p>
@@ -2093,7 +2095,7 @@
             <a:fld id="{C8C39B41-D8B5-4052-B551-9B5525EAA8B6}" type="datetimeFigureOut">
               <a:rPr lang="en-US" dirty="0"/>
               <a:pPr/>
-              <a:t>11/16/2014</a:t>
+              <a:t>11/15/2014</a:t>
             </a:fld>
             <a:endParaRPr lang="en-US" dirty="0"/>
           </a:p>
@@ -2261,7 +2263,7 @@
             <a:fld id="{4D94136C-8742-45B2-AF27-D93DF72833A9}" type="datetimeFigureOut">
               <a:rPr lang="en-US" dirty="0"/>
               <a:pPr/>
-              <a:t>11/16/2014</a:t>
+              <a:t>11/15/2014</a:t>
             </a:fld>
             <a:endParaRPr lang="en-US" dirty="0"/>
           </a:p>
@@ -2612,7 +2614,7 @@
             <a:fld id="{32ABBEA6-7C60-4B02-AE87-00D78D8422AF}" type="datetimeFigureOut">
               <a:rPr lang="en-US" dirty="0"/>
               <a:pPr/>
-              <a:t>11/16/2014</a:t>
+              <a:t>11/15/2014</a:t>
             </a:fld>
             <a:endParaRPr lang="en-US" dirty="0"/>
           </a:p>
@@ -2991,7 +2993,7 @@
             <a:fld id="{C9CAD897-D46E-4AD2-BD9B-49DD3E640873}" type="datetimeFigureOut">
               <a:rPr lang="en-US" dirty="0"/>
               <a:pPr/>
-              <a:t>11/16/2014</a:t>
+              <a:t>11/15/2014</a:t>
             </a:fld>
             <a:endParaRPr lang="en-US" dirty="0"/>
           </a:p>
@@ -3275,7 +3277,7 @@
             <a:fld id="{98624D31-43A5-475A-80CF-332C9F6DCF35}" type="datetimeFigureOut">
               <a:rPr lang="en-US" dirty="0"/>
               <a:pPr/>
-              <a:t>11/16/2014</a:t>
+              <a:t>11/15/2014</a:t>
             </a:fld>
             <a:endParaRPr lang="en-US" dirty="0"/>
           </a:p>
@@ -3872,7 +3874,7 @@
     </p:spTree>
     <p:extLst>
       <p:ext uri="{BB962C8B-B14F-4D97-AF65-F5344CB8AC3E}">
-        <p14:creationId xmlns:p14="http://schemas.microsoft.com/office/powerpoint/2010/main" xmlns="" val="563264941"/>
+        <p14:creationId xmlns:p14="http://schemas.microsoft.com/office/powerpoint/2010/main" val="563264941"/>
       </p:ext>
     </p:extLst>
   </p:cSld>
@@ -3922,142 +3924,59 @@
           <a:lstStyle/>
           <a:p>
             <a:r>
+              <a:rPr lang="en-US" altLang="zh-CN" dirty="0"/>
+              <a:t>Density </a:t>
+            </a:r>
+            <a:r>
               <a:rPr lang="en-US" dirty="0" smtClean="0"/>
-              <a:t>Beam Deflection (cont.)</a:t>
-            </a:r>
-            <a:endParaRPr lang="en-US" dirty="0"/>
-          </a:p>
-        </p:txBody>
-      </p:sp>
-      <p:sp>
-        <p:nvSpPr>
-          <p:cNvPr id="3" name="Content Placeholder 2"/>
-          <p:cNvSpPr>
-            <a:spLocks noGrp="1"/>
-          </p:cNvSpPr>
+              <a:t>(</a:t>
+            </a:r>
+            <a:r>
+              <a:rPr lang="en-US" dirty="0"/>
+              <a:t>cont.)</a:t>
+            </a:r>
+          </a:p>
+        </p:txBody>
+      </p:sp>
+      <p:pic>
+        <p:nvPicPr>
+          <p:cNvPr id="4" name="Content Placeholder 3"/>
+          <p:cNvPicPr>
+            <a:picLocks noGrp="1" noChangeAspect="1"/>
+          </p:cNvPicPr>
           <p:nvPr>
             <p:ph idx="1"/>
           </p:nvPr>
-        </p:nvSpPr>
-        <p:spPr/>
-        <p:txBody>
-          <a:bodyPr>
-            <a:noAutofit/>
-          </a:bodyPr>
-          <a:lstStyle/>
-          <a:p>
-            <a:r>
-              <a:rPr lang="en-US" sz="1600" b="1" dirty="0" smtClean="0"/>
-              <a:t>//KB and KS constants</a:t>
-            </a:r>
-          </a:p>
-          <a:p>
-            <a:r>
-              <a:rPr lang="en-US" sz="1600" b="1" dirty="0" smtClean="0"/>
-              <a:t>const double KB = 0.020833333333;	// 1/48</a:t>
-            </a:r>
-          </a:p>
-          <a:p>
-            <a:r>
-              <a:rPr lang="en-US" sz="1600" b="1" dirty="0" smtClean="0"/>
-              <a:t>const double KS = 0.25;		// 1/4</a:t>
-            </a:r>
-          </a:p>
-          <a:p>
-            <a:r>
-              <a:rPr lang="en-US" sz="1600" b="1" dirty="0" smtClean="0"/>
-              <a:t>		</a:t>
-            </a:r>
-          </a:p>
-          <a:p>
-            <a:r>
-              <a:rPr lang="en-US" sz="1600" b="1" dirty="0" smtClean="0"/>
-              <a:t>//Calculate beam moment of inertia</a:t>
-            </a:r>
-          </a:p>
-          <a:p>
-            <a:r>
-              <a:rPr lang="en-US" sz="1600" b="1" dirty="0" smtClean="0"/>
-              <a:t>// I = (b * h^3) / 12</a:t>
-            </a:r>
-          </a:p>
-          <a:p>
-            <a:r>
-              <a:rPr lang="en-US" sz="1600" b="1" dirty="0" smtClean="0"/>
-              <a:t>double inertia = (</a:t>
-            </a:r>
-            <a:r>
-              <a:rPr lang="en-US" sz="1600" b="1" dirty="0" err="1" smtClean="0"/>
-              <a:t>beamWidth</a:t>
-            </a:r>
-            <a:r>
-              <a:rPr lang="en-US" sz="1600" b="1" dirty="0" smtClean="0"/>
-              <a:t> * </a:t>
-            </a:r>
-            <a:r>
-              <a:rPr lang="en-US" sz="1600" b="1" dirty="0" err="1" smtClean="0"/>
-              <a:t>Math.Pow</a:t>
-            </a:r>
-            <a:r>
-              <a:rPr lang="en-US" sz="1600" b="1" dirty="0" smtClean="0"/>
-              <a:t>(beamDepth,3) / 12);</a:t>
-            </a:r>
-          </a:p>
-          <a:p>
-            <a:r>
-              <a:rPr lang="en-US" sz="1600" b="1" dirty="0" smtClean="0"/>
-              <a:t>				</a:t>
-            </a:r>
-          </a:p>
-          <a:p>
-            <a:r>
-              <a:rPr lang="en-US" sz="1600" b="1" dirty="0" smtClean="0"/>
-              <a:t>//Calculate the modified beam area</a:t>
-            </a:r>
-          </a:p>
-          <a:p>
-            <a:r>
-              <a:rPr lang="en-US" sz="1600" b="1" dirty="0" smtClean="0"/>
-              <a:t>// A` = 5/6 * b * h				</a:t>
-            </a:r>
-          </a:p>
-          <a:p>
-            <a:r>
-              <a:rPr lang="en-US" sz="1600" b="1" dirty="0" smtClean="0"/>
-              <a:t>double area = (5.0 / 6.0) * </a:t>
-            </a:r>
-            <a:r>
-              <a:rPr lang="en-US" sz="1600" b="1" dirty="0" err="1" smtClean="0"/>
-              <a:t>beamWidth</a:t>
-            </a:r>
-            <a:r>
-              <a:rPr lang="en-US" sz="1600" b="1" dirty="0" smtClean="0"/>
-              <a:t> * </a:t>
-            </a:r>
-            <a:r>
-              <a:rPr lang="en-US" sz="1600" b="1" dirty="0" err="1" smtClean="0"/>
-              <a:t>beamDepth</a:t>
-            </a:r>
-            <a:r>
-              <a:rPr lang="en-US" sz="1600" b="1" dirty="0" smtClean="0"/>
-              <a:t>;</a:t>
-            </a:r>
-            <a:endParaRPr lang="en-US" sz="1600" b="1" dirty="0"/>
-          </a:p>
-        </p:txBody>
-      </p:sp>
+        </p:nvPicPr>
+        <p:blipFill>
+          <a:blip r:embed="rId2">
+            <a:extLst>
+              <a:ext uri="{28A0092B-C50C-407E-A947-70E740481C1C}">
+                <a14:useLocalDpi xmlns:a14="http://schemas.microsoft.com/office/drawing/2010/main" val="0"/>
+              </a:ext>
+            </a:extLst>
+          </a:blip>
+          <a:stretch>
+            <a:fillRect/>
+          </a:stretch>
+        </p:blipFill>
+        <p:spPr>
+          <a:xfrm>
+            <a:off x="1096963" y="1867951"/>
+            <a:ext cx="10058400" cy="3979348"/>
+          </a:xfrm>
+        </p:spPr>
+      </p:pic>
     </p:spTree>
+    <p:extLst>
+      <p:ext uri="{BB962C8B-B14F-4D97-AF65-F5344CB8AC3E}">
+        <p14:creationId xmlns:p14="http://schemas.microsoft.com/office/powerpoint/2010/main" val="3628837149"/>
+      </p:ext>
+    </p:extLst>
   </p:cSld>
   <p:clrMapOvr>
     <a:masterClrMapping/>
   </p:clrMapOvr>
-  <p:timing>
-    <p:tnLst>
-      <p:par>
-        <p:cTn id="1" dur="indefinite" restart="never" nodeType="tmRoot"/>
-      </p:par>
-    </p:tnLst>
-  </p:timing>
 </p:sld>
 </file>
 
@@ -4095,120 +4014,46 @@
           <a:p>
             <a:r>
               <a:rPr lang="en-US" dirty="0" smtClean="0"/>
-              <a:t>Beam Deflection (cont.)</a:t>
-            </a:r>
-            <a:endParaRPr lang="en-US" dirty="0"/>
-          </a:p>
-        </p:txBody>
-      </p:sp>
-      <p:sp>
-        <p:nvSpPr>
-          <p:cNvPr id="3" name="Content Placeholder 2"/>
-          <p:cNvSpPr>
-            <a:spLocks noGrp="1"/>
-          </p:cNvSpPr>
+              <a:t>Beam Deflection</a:t>
+            </a:r>
+            <a:endParaRPr lang="en-US" dirty="0"/>
+          </a:p>
+        </p:txBody>
+      </p:sp>
+      <p:pic>
+        <p:nvPicPr>
+          <p:cNvPr id="1026" name="Picture 2"/>
+          <p:cNvPicPr>
+            <a:picLocks noGrp="1" noChangeAspect="1" noChangeArrowheads="1"/>
+          </p:cNvPicPr>
           <p:nvPr>
             <p:ph idx="1"/>
           </p:nvPr>
-        </p:nvSpPr>
-        <p:spPr/>
-        <p:txBody>
-          <a:bodyPr>
-            <a:normAutofit/>
-          </a:bodyPr>
-          <a:lstStyle/>
-          <a:p>
-            <a:r>
-              <a:rPr lang="en-US" sz="2400" b="1" dirty="0" smtClean="0"/>
-              <a:t>//</a:t>
-            </a:r>
-            <a:r>
-              <a:rPr lang="en-US" sz="2400" b="1" dirty="0" smtClean="0"/>
-              <a:t>Calculate beam deflection</a:t>
-            </a:r>
-          </a:p>
-          <a:p>
-            <a:r>
-              <a:rPr lang="en-US" sz="2400" b="1" dirty="0" smtClean="0"/>
-              <a:t>// </a:t>
-            </a:r>
-            <a:r>
-              <a:rPr lang="en-US" sz="2400" b="1" dirty="0" err="1" smtClean="0"/>
-              <a:t>beamDeflection</a:t>
-            </a:r>
-            <a:r>
-              <a:rPr lang="en-US" sz="2400" b="1" dirty="0" smtClean="0"/>
-              <a:t> = ((( KB * W * L^3 ) / (E * I )) + (( KS * W * L) / ( G * A` )))</a:t>
-            </a:r>
-          </a:p>
-          <a:p>
-            <a:r>
-              <a:rPr lang="en-US" sz="2400" b="1" dirty="0" smtClean="0"/>
-              <a:t>return (((KB * </a:t>
-            </a:r>
-            <a:r>
-              <a:rPr lang="en-US" sz="2400" b="1" dirty="0" err="1" smtClean="0"/>
-              <a:t>beamLoad</a:t>
-            </a:r>
-            <a:r>
-              <a:rPr lang="en-US" sz="2400" b="1" dirty="0" smtClean="0"/>
-              <a:t> * </a:t>
-            </a:r>
-            <a:r>
-              <a:rPr lang="en-US" sz="2400" b="1" dirty="0" err="1" smtClean="0"/>
-              <a:t>Math.Pow</a:t>
-            </a:r>
-            <a:r>
-              <a:rPr lang="en-US" sz="2400" b="1" dirty="0" smtClean="0"/>
-              <a:t>(</a:t>
-            </a:r>
-            <a:r>
-              <a:rPr lang="en-US" sz="2400" b="1" dirty="0" err="1" smtClean="0"/>
-              <a:t>beamSpan</a:t>
-            </a:r>
-            <a:r>
-              <a:rPr lang="en-US" sz="2400" b="1" dirty="0" smtClean="0"/>
-              <a:t>, 3)) / (elasticity * inertia)) +</a:t>
-            </a:r>
-          </a:p>
-          <a:p>
-            <a:r>
-              <a:rPr lang="en-US" sz="2400" b="1" dirty="0" smtClean="0"/>
-              <a:t>	((KS * </a:t>
-            </a:r>
-            <a:r>
-              <a:rPr lang="en-US" sz="2400" b="1" dirty="0" err="1" smtClean="0"/>
-              <a:t>beamLoad</a:t>
-            </a:r>
-            <a:r>
-              <a:rPr lang="en-US" sz="2400" b="1" dirty="0" smtClean="0"/>
-              <a:t> * </a:t>
-            </a:r>
-            <a:r>
-              <a:rPr lang="en-US" sz="2400" b="1" dirty="0" err="1" smtClean="0"/>
-              <a:t>beamSpan</a:t>
-            </a:r>
-            <a:r>
-              <a:rPr lang="en-US" sz="2400" b="1" dirty="0" smtClean="0"/>
-              <a:t>)   / (</a:t>
-            </a:r>
-            <a:r>
-              <a:rPr lang="en-US" sz="2400" b="1" dirty="0" err="1" smtClean="0"/>
-              <a:t>beamShear</a:t>
-            </a:r>
-            <a:r>
-              <a:rPr lang="en-US" sz="2400" b="1" dirty="0" smtClean="0"/>
-              <a:t> * area)));</a:t>
-            </a:r>
-          </a:p>
-          <a:p>
-            <a:endParaRPr lang="en-US" b="1" dirty="0" smtClean="0"/>
-          </a:p>
-          <a:p>
-            <a:endParaRPr lang="en-US" b="1" dirty="0"/>
-          </a:p>
-        </p:txBody>
-      </p:sp>
+        </p:nvPicPr>
+        <p:blipFill>
+          <a:blip r:embed="rId2"/>
+          <a:srcRect/>
+          <a:stretch>
+            <a:fillRect/>
+          </a:stretch>
+        </p:blipFill>
+        <p:spPr bwMode="auto">
+          <a:xfrm>
+            <a:off x="3082925" y="2085975"/>
+            <a:ext cx="6086475" cy="3543300"/>
+          </a:xfrm>
+          <a:prstGeom prst="rect">
+            <a:avLst/>
+          </a:prstGeom>
+          <a:noFill/>
+          <a:ln w="9525">
+            <a:noFill/>
+            <a:miter lim="800000"/>
+            <a:headEnd/>
+            <a:tailEnd/>
+          </a:ln>
+        </p:spPr>
+      </p:pic>
     </p:spTree>
   </p:cSld>
   <p:clrMapOvr>
@@ -4277,6 +4122,337 @@
         <p:spPr/>
         <p:txBody>
           <a:bodyPr>
+            <a:noAutofit/>
+          </a:bodyPr>
+          <a:lstStyle/>
+          <a:p>
+            <a:r>
+              <a:rPr lang="en-US" sz="1600" b="1" dirty="0" smtClean="0"/>
+              <a:t>//KB and KS constants</a:t>
+            </a:r>
+          </a:p>
+          <a:p>
+            <a:r>
+              <a:rPr lang="en-US" sz="1600" b="1" dirty="0" smtClean="0"/>
+              <a:t>const double KB = 0.020833333333;	// 1/48</a:t>
+            </a:r>
+          </a:p>
+          <a:p>
+            <a:r>
+              <a:rPr lang="en-US" sz="1600" b="1" dirty="0" smtClean="0"/>
+              <a:t>const double KS = 0.25;		// 1/4</a:t>
+            </a:r>
+          </a:p>
+          <a:p>
+            <a:r>
+              <a:rPr lang="en-US" sz="1600" b="1" dirty="0" smtClean="0"/>
+              <a:t>		</a:t>
+            </a:r>
+          </a:p>
+          <a:p>
+            <a:r>
+              <a:rPr lang="en-US" sz="1600" b="1" dirty="0" smtClean="0"/>
+              <a:t>//Calculate beam moment of inertia</a:t>
+            </a:r>
+          </a:p>
+          <a:p>
+            <a:r>
+              <a:rPr lang="en-US" sz="1600" b="1" dirty="0" smtClean="0"/>
+              <a:t>// I = (b * h^3) / 12</a:t>
+            </a:r>
+          </a:p>
+          <a:p>
+            <a:r>
+              <a:rPr lang="en-US" sz="1600" b="1" dirty="0" smtClean="0"/>
+              <a:t>double inertia = (</a:t>
+            </a:r>
+            <a:r>
+              <a:rPr lang="en-US" sz="1600" b="1" dirty="0" err="1" smtClean="0"/>
+              <a:t>beamWidth</a:t>
+            </a:r>
+            <a:r>
+              <a:rPr lang="en-US" sz="1600" b="1" dirty="0" smtClean="0"/>
+              <a:t> * </a:t>
+            </a:r>
+            <a:r>
+              <a:rPr lang="en-US" sz="1600" b="1" dirty="0" err="1" smtClean="0"/>
+              <a:t>Math.Pow</a:t>
+            </a:r>
+            <a:r>
+              <a:rPr lang="en-US" sz="1600" b="1" dirty="0" smtClean="0"/>
+              <a:t>(beamDepth,3) / 12);</a:t>
+            </a:r>
+          </a:p>
+          <a:p>
+            <a:r>
+              <a:rPr lang="en-US" sz="1600" b="1" dirty="0" smtClean="0"/>
+              <a:t>				</a:t>
+            </a:r>
+          </a:p>
+          <a:p>
+            <a:r>
+              <a:rPr lang="en-US" sz="1600" b="1" dirty="0" smtClean="0"/>
+              <a:t>//Calculate the modified beam area</a:t>
+            </a:r>
+          </a:p>
+          <a:p>
+            <a:r>
+              <a:rPr lang="en-US" sz="1600" b="1" dirty="0" smtClean="0"/>
+              <a:t>// A` = 5/6 * b * h				</a:t>
+            </a:r>
+          </a:p>
+          <a:p>
+            <a:r>
+              <a:rPr lang="en-US" sz="1600" b="1" dirty="0" smtClean="0"/>
+              <a:t>double area = (5.0 / 6.0) * </a:t>
+            </a:r>
+            <a:r>
+              <a:rPr lang="en-US" sz="1600" b="1" dirty="0" err="1" smtClean="0"/>
+              <a:t>beamWidth</a:t>
+            </a:r>
+            <a:r>
+              <a:rPr lang="en-US" sz="1600" b="1" dirty="0" smtClean="0"/>
+              <a:t> * </a:t>
+            </a:r>
+            <a:r>
+              <a:rPr lang="en-US" sz="1600" b="1" dirty="0" err="1" smtClean="0"/>
+              <a:t>beamDepth</a:t>
+            </a:r>
+            <a:r>
+              <a:rPr lang="en-US" sz="1600" b="1" dirty="0" smtClean="0"/>
+              <a:t>;</a:t>
+            </a:r>
+            <a:endParaRPr lang="en-US" sz="1600" b="1" dirty="0"/>
+          </a:p>
+        </p:txBody>
+      </p:sp>
+    </p:spTree>
+  </p:cSld>
+  <p:clrMapOvr>
+    <a:masterClrMapping/>
+  </p:clrMapOvr>
+  <p:timing>
+    <p:tnLst>
+      <p:par>
+        <p:cTn id="1" dur="indefinite" restart="never" nodeType="tmRoot"/>
+      </p:par>
+    </p:tnLst>
+  </p:timing>
+</p:sld>
+</file>
+
+<file path=ppt/slides/slide13.xml><?xml version="1.0" encoding="utf-8"?>
+<p:sld xmlns:a="http://schemas.openxmlformats.org/drawingml/2006/main" xmlns:r="http://schemas.openxmlformats.org/officeDocument/2006/relationships" xmlns:p="http://schemas.openxmlformats.org/presentationml/2006/main">
+  <p:cSld>
+    <p:spTree>
+      <p:nvGrpSpPr>
+        <p:cNvPr id="1" name=""/>
+        <p:cNvGrpSpPr/>
+        <p:nvPr/>
+      </p:nvGrpSpPr>
+      <p:grpSpPr>
+        <a:xfrm>
+          <a:off x="0" y="0"/>
+          <a:ext cx="0" cy="0"/>
+          <a:chOff x="0" y="0"/>
+          <a:chExt cx="0" cy="0"/>
+        </a:xfrm>
+      </p:grpSpPr>
+      <p:sp>
+        <p:nvSpPr>
+          <p:cNvPr id="2" name="Title 1"/>
+          <p:cNvSpPr>
+            <a:spLocks noGrp="1"/>
+          </p:cNvSpPr>
+          <p:nvPr>
+            <p:ph type="title"/>
+          </p:nvPr>
+        </p:nvSpPr>
+        <p:spPr/>
+        <p:txBody>
+          <a:bodyPr/>
+          <a:lstStyle/>
+          <a:p>
+            <a:r>
+              <a:rPr lang="en-US" dirty="0" smtClean="0"/>
+              <a:t>Beam Deflection (cont.)</a:t>
+            </a:r>
+            <a:endParaRPr lang="en-US" dirty="0"/>
+          </a:p>
+        </p:txBody>
+      </p:sp>
+      <p:sp>
+        <p:nvSpPr>
+          <p:cNvPr id="3" name="Content Placeholder 2"/>
+          <p:cNvSpPr>
+            <a:spLocks noGrp="1"/>
+          </p:cNvSpPr>
+          <p:nvPr>
+            <p:ph idx="1"/>
+          </p:nvPr>
+        </p:nvSpPr>
+        <p:spPr/>
+        <p:txBody>
+          <a:bodyPr>
+            <a:normAutofit/>
+          </a:bodyPr>
+          <a:lstStyle/>
+          <a:p>
+            <a:r>
+              <a:rPr lang="en-US" sz="2400" b="1" dirty="0" smtClean="0"/>
+              <a:t>//Calculate beam deflection</a:t>
+            </a:r>
+          </a:p>
+          <a:p>
+            <a:r>
+              <a:rPr lang="en-US" sz="2400" b="1" dirty="0" smtClean="0"/>
+              <a:t>// </a:t>
+            </a:r>
+            <a:r>
+              <a:rPr lang="en-US" sz="2400" b="1" dirty="0" err="1" smtClean="0"/>
+              <a:t>beamDeflection</a:t>
+            </a:r>
+            <a:r>
+              <a:rPr lang="en-US" sz="2400" b="1" dirty="0" smtClean="0"/>
+              <a:t> = ((( KB * W * L^3 ) / (E * I )) + (( KS * W * L) / ( G * A` )))</a:t>
+            </a:r>
+          </a:p>
+          <a:p>
+            <a:r>
+              <a:rPr lang="en-US" sz="2400" b="1" dirty="0" smtClean="0"/>
+              <a:t>return (((KB * </a:t>
+            </a:r>
+            <a:r>
+              <a:rPr lang="en-US" sz="2400" b="1" dirty="0" err="1" smtClean="0"/>
+              <a:t>beamLoad</a:t>
+            </a:r>
+            <a:r>
+              <a:rPr lang="en-US" sz="2400" b="1" dirty="0" smtClean="0"/>
+              <a:t> * </a:t>
+            </a:r>
+            <a:r>
+              <a:rPr lang="en-US" sz="2400" b="1" dirty="0" err="1" smtClean="0"/>
+              <a:t>Math.Pow</a:t>
+            </a:r>
+            <a:r>
+              <a:rPr lang="en-US" sz="2400" b="1" dirty="0" smtClean="0"/>
+              <a:t>(</a:t>
+            </a:r>
+            <a:r>
+              <a:rPr lang="en-US" sz="2400" b="1" dirty="0" err="1" smtClean="0"/>
+              <a:t>beamSpan</a:t>
+            </a:r>
+            <a:r>
+              <a:rPr lang="en-US" sz="2400" b="1" dirty="0" smtClean="0"/>
+              <a:t>, 3)) / (elasticity * inertia)) +</a:t>
+            </a:r>
+          </a:p>
+          <a:p>
+            <a:r>
+              <a:rPr lang="en-US" sz="2400" b="1" dirty="0" smtClean="0"/>
+              <a:t>	((KS * </a:t>
+            </a:r>
+            <a:r>
+              <a:rPr lang="en-US" sz="2400" b="1" dirty="0" err="1" smtClean="0"/>
+              <a:t>beamLoad</a:t>
+            </a:r>
+            <a:r>
+              <a:rPr lang="en-US" sz="2400" b="1" dirty="0" smtClean="0"/>
+              <a:t> * </a:t>
+            </a:r>
+            <a:r>
+              <a:rPr lang="en-US" sz="2400" b="1" dirty="0" err="1" smtClean="0"/>
+              <a:t>beamSpan</a:t>
+            </a:r>
+            <a:r>
+              <a:rPr lang="en-US" sz="2400" b="1" dirty="0" smtClean="0"/>
+              <a:t>)   / (</a:t>
+            </a:r>
+            <a:r>
+              <a:rPr lang="en-US" sz="2400" b="1" dirty="0" err="1" smtClean="0"/>
+              <a:t>beamShear</a:t>
+            </a:r>
+            <a:r>
+              <a:rPr lang="en-US" sz="2400" b="1" dirty="0" smtClean="0"/>
+              <a:t> * area)));</a:t>
+            </a:r>
+          </a:p>
+          <a:p>
+            <a:endParaRPr lang="en-US" b="1" dirty="0" smtClean="0"/>
+          </a:p>
+          <a:p>
+            <a:endParaRPr lang="en-US" b="1" dirty="0"/>
+          </a:p>
+        </p:txBody>
+      </p:sp>
+    </p:spTree>
+  </p:cSld>
+  <p:clrMapOvr>
+    <a:masterClrMapping/>
+  </p:clrMapOvr>
+  <p:timing>
+    <p:tnLst>
+      <p:par>
+        <p:cTn id="1" dur="indefinite" restart="never" nodeType="tmRoot"/>
+      </p:par>
+    </p:tnLst>
+  </p:timing>
+</p:sld>
+</file>
+
+<file path=ppt/slides/slide14.xml><?xml version="1.0" encoding="utf-8"?>
+<p:sld xmlns:a="http://schemas.openxmlformats.org/drawingml/2006/main" xmlns:r="http://schemas.openxmlformats.org/officeDocument/2006/relationships" xmlns:p="http://schemas.openxmlformats.org/presentationml/2006/main">
+  <p:cSld>
+    <p:spTree>
+      <p:nvGrpSpPr>
+        <p:cNvPr id="1" name=""/>
+        <p:cNvGrpSpPr/>
+        <p:nvPr/>
+      </p:nvGrpSpPr>
+      <p:grpSpPr>
+        <a:xfrm>
+          <a:off x="0" y="0"/>
+          <a:ext cx="0" cy="0"/>
+          <a:chOff x="0" y="0"/>
+          <a:chExt cx="0" cy="0"/>
+        </a:xfrm>
+      </p:grpSpPr>
+      <p:sp>
+        <p:nvSpPr>
+          <p:cNvPr id="2" name="Title 1"/>
+          <p:cNvSpPr>
+            <a:spLocks noGrp="1"/>
+          </p:cNvSpPr>
+          <p:nvPr>
+            <p:ph type="title"/>
+          </p:nvPr>
+        </p:nvSpPr>
+        <p:spPr/>
+        <p:txBody>
+          <a:bodyPr/>
+          <a:lstStyle/>
+          <a:p>
+            <a:r>
+              <a:rPr lang="en-US" dirty="0" smtClean="0"/>
+              <a:t>Beam Deflection (cont.)</a:t>
+            </a:r>
+            <a:endParaRPr lang="en-US" dirty="0"/>
+          </a:p>
+        </p:txBody>
+      </p:sp>
+      <p:sp>
+        <p:nvSpPr>
+          <p:cNvPr id="3" name="Content Placeholder 2"/>
+          <p:cNvSpPr>
+            <a:spLocks noGrp="1"/>
+          </p:cNvSpPr>
+          <p:nvPr>
+            <p:ph idx="1"/>
+          </p:nvPr>
+        </p:nvSpPr>
+        <p:spPr/>
+        <p:txBody>
+          <a:bodyPr>
             <a:normAutofit/>
           </a:bodyPr>
           <a:lstStyle/>
@@ -4496,7 +4672,7 @@
     </p:spTree>
     <p:extLst>
       <p:ext uri="{BB962C8B-B14F-4D97-AF65-F5344CB8AC3E}">
-        <p14:creationId xmlns:p14="http://schemas.microsoft.com/office/powerpoint/2010/main" xmlns="" val="248198263"/>
+        <p14:creationId xmlns:p14="http://schemas.microsoft.com/office/powerpoint/2010/main" val="248198263"/>
       </p:ext>
     </p:extLst>
   </p:cSld>
@@ -4626,7 +4802,7 @@
     </p:spTree>
     <p:extLst>
       <p:ext uri="{BB962C8B-B14F-4D97-AF65-F5344CB8AC3E}">
-        <p14:creationId xmlns:p14="http://schemas.microsoft.com/office/powerpoint/2010/main" xmlns="" val="2700358313"/>
+        <p14:creationId xmlns:p14="http://schemas.microsoft.com/office/powerpoint/2010/main" val="2700358313"/>
       </p:ext>
     </p:extLst>
   </p:cSld>
@@ -4783,7 +4959,7 @@
     </p:spTree>
     <p:extLst>
       <p:ext uri="{BB962C8B-B14F-4D97-AF65-F5344CB8AC3E}">
-        <p14:creationId xmlns:p14="http://schemas.microsoft.com/office/powerpoint/2010/main" xmlns="" val="2029206957"/>
+        <p14:creationId xmlns:p14="http://schemas.microsoft.com/office/powerpoint/2010/main" val="2029206957"/>
       </p:ext>
     </p:extLst>
   </p:cSld>
@@ -4907,7 +5083,7 @@
     </p:spTree>
     <p:extLst>
       <p:ext uri="{BB962C8B-B14F-4D97-AF65-F5344CB8AC3E}">
-        <p14:creationId xmlns:p14="http://schemas.microsoft.com/office/powerpoint/2010/main" xmlns="" val="921941208"/>
+        <p14:creationId xmlns:p14="http://schemas.microsoft.com/office/powerpoint/2010/main" val="921941208"/>
       </p:ext>
     </p:extLst>
   </p:cSld>
@@ -5013,7 +5189,7 @@
     </p:spTree>
     <p:extLst>
       <p:ext uri="{BB962C8B-B14F-4D97-AF65-F5344CB8AC3E}">
-        <p14:creationId xmlns:p14="http://schemas.microsoft.com/office/powerpoint/2010/main" xmlns="" val="2763518482"/>
+        <p14:creationId xmlns:p14="http://schemas.microsoft.com/office/powerpoint/2010/main" val="2763518482"/>
       </p:ext>
     </p:extLst>
   </p:cSld>
@@ -5097,7 +5273,7 @@
     </p:spTree>
     <p:extLst>
       <p:ext uri="{BB962C8B-B14F-4D97-AF65-F5344CB8AC3E}">
-        <p14:creationId xmlns:p14="http://schemas.microsoft.com/office/powerpoint/2010/main" xmlns="" val="2337029756"/>
+        <p14:creationId xmlns:p14="http://schemas.microsoft.com/office/powerpoint/2010/main" val="2337029756"/>
       </p:ext>
     </p:extLst>
   </p:cSld>
@@ -5185,7 +5361,7 @@
     </p:spTree>
     <p:extLst>
       <p:ext uri="{BB962C8B-B14F-4D97-AF65-F5344CB8AC3E}">
-        <p14:creationId xmlns:p14="http://schemas.microsoft.com/office/powerpoint/2010/main" xmlns="" val="81708855"/>
+        <p14:creationId xmlns:p14="http://schemas.microsoft.com/office/powerpoint/2010/main" val="81708855"/>
       </p:ext>
     </p:extLst>
   </p:cSld>
@@ -5235,8 +5411,8 @@
           <a:lstStyle/>
           <a:p>
             <a:r>
-              <a:rPr lang="en-US" dirty="0" smtClean="0"/>
-              <a:t>Beam Deflection</a:t>
+              <a:rPr lang="en-US" altLang="zh-CN" dirty="0" smtClean="0"/>
+              <a:t>Density</a:t>
             </a:r>
             <a:endParaRPr lang="en-US" dirty="0"/>
           </a:p>
@@ -5244,50 +5420,43 @@
       </p:sp>
       <p:pic>
         <p:nvPicPr>
-          <p:cNvPr id="1026" name="Picture 2"/>
+          <p:cNvPr id="4" name="Content Placeholder 3"/>
           <p:cNvPicPr>
-            <a:picLocks noGrp="1" noChangeAspect="1" noChangeArrowheads="1"/>
+            <a:picLocks noGrp="1" noChangeAspect="1"/>
           </p:cNvPicPr>
           <p:nvPr>
             <p:ph idx="1"/>
           </p:nvPr>
         </p:nvPicPr>
         <p:blipFill>
-          <a:blip r:embed="rId2"/>
-          <a:srcRect/>
+          <a:blip r:embed="rId2">
+            <a:extLst>
+              <a:ext uri="{28A0092B-C50C-407E-A947-70E740481C1C}">
+                <a14:useLocalDpi xmlns:a14="http://schemas.microsoft.com/office/drawing/2010/main" val="0"/>
+              </a:ext>
+            </a:extLst>
+          </a:blip>
           <a:stretch>
             <a:fillRect/>
           </a:stretch>
         </p:blipFill>
-        <p:spPr bwMode="auto">
+        <p:spPr>
           <a:xfrm>
-            <a:off x="3082925" y="2085975"/>
-            <a:ext cx="6086475" cy="3543300"/>
+            <a:off x="4778187" y="2238149"/>
+            <a:ext cx="2695951" cy="3238952"/>
           </a:xfrm>
-          <a:prstGeom prst="rect">
-            <a:avLst/>
-          </a:prstGeom>
-          <a:noFill/>
-          <a:ln w="9525">
-            <a:noFill/>
-            <a:miter lim="800000"/>
-            <a:headEnd/>
-            <a:tailEnd/>
-          </a:ln>
         </p:spPr>
       </p:pic>
     </p:spTree>
+    <p:extLst>
+      <p:ext uri="{BB962C8B-B14F-4D97-AF65-F5344CB8AC3E}">
+        <p14:creationId xmlns:p14="http://schemas.microsoft.com/office/powerpoint/2010/main" val="3922382855"/>
+      </p:ext>
+    </p:extLst>
   </p:cSld>
   <p:clrMapOvr>
     <a:masterClrMapping/>
   </p:clrMapOvr>
-  <p:timing>
-    <p:tnLst>
-      <p:par>
-        <p:cTn id="1" dur="indefinite" restart="never" nodeType="tmRoot"/>
-      </p:par>
-    </p:tnLst>
-  </p:timing>
 </p:sld>
 </file>
 
@@ -5568,7 +5737,7 @@
   <a:extraClrSchemeLst/>
   <a:extLst>
     <a:ext uri="{05A4C25C-085E-4340-85A3-A5531E510DB2}">
-      <thm15:themeFamily xmlns:thm15="http://schemas.microsoft.com/office/thememl/2012/main" xmlns="" name="Retrospect" id="{5F128B03-DCCA-4EEB-AB3B-CF2899314A46}" vid="{3F1AAB62-24C6-49D2-8E01-B56FAC9A3DCD}"/>
+      <thm15:themeFamily xmlns:thm15="http://schemas.microsoft.com/office/thememl/2012/main" name="Retrospect" id="{5F128B03-DCCA-4EEB-AB3B-CF2899314A46}" vid="{3F1AAB62-24C6-49D2-8E01-B56FAC9A3DCD}"/>
     </a:ext>
   </a:extLst>
 </a:theme>

</xml_diff>

<commit_message>
Updated beam deflection part of ppt
</commit_message>
<xml_diff>
--- a/Implementation/Implementation Team Presentation.pptx
+++ b/Implementation/Implementation Team Presentation.pptx
@@ -117,7 +117,7 @@
   </p:defaultTextStyle>
   <p:extLst>
     <p:ext uri="{EFAFB233-063F-42B5-8137-9DF3F51BA10A}">
-      <p15:sldGuideLst xmlns:p15="http://schemas.microsoft.com/office/powerpoint/2012/main">
+      <p15:sldGuideLst xmlns:p15="http://schemas.microsoft.com/office/powerpoint/2012/main" xmlns="">
         <p15:guide id="1" orient="horz" pos="2160">
           <p15:clr>
             <a:srgbClr val="A4A3A4"/>
@@ -3872,7 +3872,7 @@
     </p:spTree>
     <p:extLst>
       <p:ext uri="{BB962C8B-B14F-4D97-AF65-F5344CB8AC3E}">
-        <p14:creationId xmlns:p14="http://schemas.microsoft.com/office/powerpoint/2010/main" val="563264941"/>
+        <p14:creationId xmlns:p14="http://schemas.microsoft.com/office/powerpoint/2010/main" xmlns="" val="563264941"/>
       </p:ext>
     </p:extLst>
   </p:cSld>
@@ -3942,107 +3942,107 @@
         <p:spPr/>
         <p:txBody>
           <a:bodyPr>
-            <a:normAutofit fontScale="85000" lnSpcReduction="20000"/>
+            <a:noAutofit/>
           </a:bodyPr>
           <a:lstStyle/>
           <a:p>
             <a:r>
-              <a:rPr lang="en-US" dirty="0" smtClean="0"/>
+              <a:rPr lang="en-US" sz="1600" b="1" dirty="0" smtClean="0"/>
               <a:t>//KB and KS constants</a:t>
             </a:r>
           </a:p>
           <a:p>
             <a:r>
-              <a:rPr lang="en-US" dirty="0" smtClean="0"/>
+              <a:rPr lang="en-US" sz="1600" b="1" dirty="0" smtClean="0"/>
               <a:t>const double KB = 0.020833333333;	// 1/48</a:t>
             </a:r>
           </a:p>
           <a:p>
             <a:r>
-              <a:rPr lang="en-US" dirty="0" smtClean="0"/>
+              <a:rPr lang="en-US" sz="1600" b="1" dirty="0" smtClean="0"/>
               <a:t>const double KS = 0.25;		// 1/4</a:t>
             </a:r>
           </a:p>
           <a:p>
             <a:r>
-              <a:rPr lang="en-US" dirty="0" smtClean="0"/>
+              <a:rPr lang="en-US" sz="1600" b="1" dirty="0" smtClean="0"/>
               <a:t>		</a:t>
             </a:r>
           </a:p>
           <a:p>
             <a:r>
-              <a:rPr lang="en-US" dirty="0" smtClean="0"/>
+              <a:rPr lang="en-US" sz="1600" b="1" dirty="0" smtClean="0"/>
               <a:t>//Calculate beam moment of inertia</a:t>
             </a:r>
           </a:p>
           <a:p>
             <a:r>
-              <a:rPr lang="en-US" dirty="0" smtClean="0"/>
+              <a:rPr lang="en-US" sz="1600" b="1" dirty="0" smtClean="0"/>
               <a:t>// I = (b * h^3) / 12</a:t>
             </a:r>
           </a:p>
           <a:p>
             <a:r>
-              <a:rPr lang="en-US" dirty="0" smtClean="0"/>
+              <a:rPr lang="en-US" sz="1600" b="1" dirty="0" smtClean="0"/>
               <a:t>double inertia = (</a:t>
             </a:r>
             <a:r>
-              <a:rPr lang="en-US" dirty="0" err="1" smtClean="0"/>
+              <a:rPr lang="en-US" sz="1600" b="1" dirty="0" err="1" smtClean="0"/>
               <a:t>beamWidth</a:t>
             </a:r>
             <a:r>
-              <a:rPr lang="en-US" dirty="0" smtClean="0"/>
+              <a:rPr lang="en-US" sz="1600" b="1" dirty="0" smtClean="0"/>
               <a:t> * </a:t>
             </a:r>
             <a:r>
-              <a:rPr lang="en-US" dirty="0" err="1" smtClean="0"/>
+              <a:rPr lang="en-US" sz="1600" b="1" dirty="0" err="1" smtClean="0"/>
               <a:t>Math.Pow</a:t>
             </a:r>
             <a:r>
-              <a:rPr lang="en-US" dirty="0" smtClean="0"/>
+              <a:rPr lang="en-US" sz="1600" b="1" dirty="0" smtClean="0"/>
               <a:t>(beamDepth,3) / 12);</a:t>
             </a:r>
           </a:p>
           <a:p>
             <a:r>
-              <a:rPr lang="en-US" dirty="0" smtClean="0"/>
+              <a:rPr lang="en-US" sz="1600" b="1" dirty="0" smtClean="0"/>
               <a:t>				</a:t>
             </a:r>
           </a:p>
           <a:p>
             <a:r>
-              <a:rPr lang="en-US" dirty="0" smtClean="0"/>
+              <a:rPr lang="en-US" sz="1600" b="1" dirty="0" smtClean="0"/>
               <a:t>//Calculate the modified beam area</a:t>
             </a:r>
           </a:p>
           <a:p>
             <a:r>
-              <a:rPr lang="en-US" dirty="0" smtClean="0"/>
+              <a:rPr lang="en-US" sz="1600" b="1" dirty="0" smtClean="0"/>
               <a:t>// A` = 5/6 * b * h				</a:t>
             </a:r>
           </a:p>
           <a:p>
             <a:r>
-              <a:rPr lang="en-US" dirty="0" smtClean="0"/>
+              <a:rPr lang="en-US" sz="1600" b="1" dirty="0" smtClean="0"/>
               <a:t>double area = (5.0 / 6.0) * </a:t>
             </a:r>
             <a:r>
-              <a:rPr lang="en-US" dirty="0" err="1" smtClean="0"/>
+              <a:rPr lang="en-US" sz="1600" b="1" dirty="0" err="1" smtClean="0"/>
               <a:t>beamWidth</a:t>
             </a:r>
             <a:r>
-              <a:rPr lang="en-US" dirty="0" smtClean="0"/>
+              <a:rPr lang="en-US" sz="1600" b="1" dirty="0" smtClean="0"/>
               <a:t> * </a:t>
             </a:r>
             <a:r>
-              <a:rPr lang="en-US" dirty="0" err="1" smtClean="0"/>
+              <a:rPr lang="en-US" sz="1600" b="1" dirty="0" err="1" smtClean="0"/>
               <a:t>beamDepth</a:t>
             </a:r>
             <a:r>
-              <a:rPr lang="en-US" dirty="0" smtClean="0"/>
+              <a:rPr lang="en-US" sz="1600" b="1" dirty="0" smtClean="0"/>
               <a:t>;</a:t>
             </a:r>
-            <a:endParaRPr lang="en-US" dirty="0"/>
+            <a:endParaRPr lang="en-US" sz="1600" b="1" dirty="0"/>
           </a:p>
         </p:txBody>
       </p:sp>
@@ -4119,137 +4119,93 @@
           <a:lstStyle/>
           <a:p>
             <a:r>
-              <a:rPr lang="en-US" dirty="0" err="1" smtClean="0"/>
-              <a:t>resultDisplay.Text</a:t>
-            </a:r>
-            <a:r>
-              <a:rPr lang="en-US" dirty="0" smtClean="0"/>
-              <a:t> = </a:t>
-            </a:r>
-            <a:r>
-              <a:rPr lang="en-US" dirty="0" err="1" smtClean="0"/>
-              <a:t>wood.calculateBeamDeflection</a:t>
-            </a:r>
-            <a:r>
-              <a:rPr lang="en-US" dirty="0" smtClean="0"/>
-              <a:t>(width, depth, load, span, 	</a:t>
-            </a:r>
-          </a:p>
-          <a:p>
-            <a:pPr lvl="1">
-              <a:buNone/>
-            </a:pPr>
-            <a:r>
-              <a:rPr lang="en-US" dirty="0" smtClean="0"/>
-              <a:t>				</a:t>
-            </a:r>
-            <a:r>
-              <a:rPr lang="en-US" sz="2000" dirty="0" smtClean="0"/>
-              <a:t>elasticityIs12percent, </a:t>
-            </a:r>
-            <a:r>
-              <a:rPr lang="en-US" sz="2000" dirty="0" err="1" smtClean="0"/>
-              <a:t>grainIsFlat</a:t>
-            </a:r>
-            <a:r>
-              <a:rPr lang="en-US" sz="2000" dirty="0" smtClean="0"/>
-              <a:t>).</a:t>
-            </a:r>
-            <a:r>
-              <a:rPr lang="en-US" sz="2000" dirty="0" err="1" smtClean="0"/>
-              <a:t>ToString</a:t>
-            </a:r>
-            <a:r>
-              <a:rPr lang="en-US" sz="2000" dirty="0" smtClean="0"/>
-              <a:t>();</a:t>
-            </a:r>
-            <a:endParaRPr lang="en-US" dirty="0" smtClean="0"/>
-          </a:p>
-          <a:p>
-            <a:r>
-              <a:rPr lang="en-US" dirty="0" smtClean="0"/>
-              <a:t> //Calculate beam deflection</a:t>
-            </a:r>
-          </a:p>
-          <a:p>
-            <a:r>
-              <a:rPr lang="en-US" dirty="0" smtClean="0"/>
+              <a:rPr lang="en-US" sz="2400" b="1" dirty="0" smtClean="0"/>
+              <a:t>//</a:t>
+            </a:r>
+            <a:r>
+              <a:rPr lang="en-US" sz="2400" b="1" dirty="0" smtClean="0"/>
+              <a:t>Calculate beam deflection</a:t>
+            </a:r>
+          </a:p>
+          <a:p>
+            <a:r>
+              <a:rPr lang="en-US" sz="2400" b="1" dirty="0" smtClean="0"/>
               <a:t>// </a:t>
             </a:r>
             <a:r>
-              <a:rPr lang="en-US" dirty="0" err="1" smtClean="0"/>
+              <a:rPr lang="en-US" sz="2400" b="1" dirty="0" err="1" smtClean="0"/>
               <a:t>beamDeflection</a:t>
             </a:r>
             <a:r>
-              <a:rPr lang="en-US" dirty="0" smtClean="0"/>
+              <a:rPr lang="en-US" sz="2400" b="1" dirty="0" smtClean="0"/>
               <a:t> = ((( KB * W * L^3 ) / (E * I )) + (( KS * W * L) / ( G * A` )))</a:t>
             </a:r>
           </a:p>
           <a:p>
             <a:r>
-              <a:rPr lang="en-US" dirty="0" smtClean="0"/>
+              <a:rPr lang="en-US" sz="2400" b="1" dirty="0" smtClean="0"/>
               <a:t>return (((KB * </a:t>
             </a:r>
             <a:r>
-              <a:rPr lang="en-US" dirty="0" err="1" smtClean="0"/>
+              <a:rPr lang="en-US" sz="2400" b="1" dirty="0" err="1" smtClean="0"/>
               <a:t>beamLoad</a:t>
             </a:r>
             <a:r>
-              <a:rPr lang="en-US" dirty="0" smtClean="0"/>
+              <a:rPr lang="en-US" sz="2400" b="1" dirty="0" smtClean="0"/>
               <a:t> * </a:t>
             </a:r>
             <a:r>
-              <a:rPr lang="en-US" dirty="0" err="1" smtClean="0"/>
+              <a:rPr lang="en-US" sz="2400" b="1" dirty="0" err="1" smtClean="0"/>
               <a:t>Math.Pow</a:t>
             </a:r>
             <a:r>
-              <a:rPr lang="en-US" dirty="0" smtClean="0"/>
+              <a:rPr lang="en-US" sz="2400" b="1" dirty="0" smtClean="0"/>
               <a:t>(</a:t>
             </a:r>
             <a:r>
-              <a:rPr lang="en-US" dirty="0" err="1" smtClean="0"/>
+              <a:rPr lang="en-US" sz="2400" b="1" dirty="0" err="1" smtClean="0"/>
               <a:t>beamSpan</a:t>
             </a:r>
             <a:r>
-              <a:rPr lang="en-US" dirty="0" smtClean="0"/>
+              <a:rPr lang="en-US" sz="2400" b="1" dirty="0" smtClean="0"/>
               <a:t>, 3)) / (elasticity * inertia)) +</a:t>
             </a:r>
           </a:p>
           <a:p>
             <a:r>
-              <a:rPr lang="en-US" dirty="0" smtClean="0"/>
+              <a:rPr lang="en-US" sz="2400" b="1" dirty="0" smtClean="0"/>
               <a:t>	((KS * </a:t>
             </a:r>
             <a:r>
-              <a:rPr lang="en-US" dirty="0" err="1" smtClean="0"/>
+              <a:rPr lang="en-US" sz="2400" b="1" dirty="0" err="1" smtClean="0"/>
               <a:t>beamLoad</a:t>
             </a:r>
             <a:r>
-              <a:rPr lang="en-US" dirty="0" smtClean="0"/>
+              <a:rPr lang="en-US" sz="2400" b="1" dirty="0" smtClean="0"/>
               <a:t> * </a:t>
             </a:r>
             <a:r>
-              <a:rPr lang="en-US" dirty="0" err="1" smtClean="0"/>
+              <a:rPr lang="en-US" sz="2400" b="1" dirty="0" err="1" smtClean="0"/>
               <a:t>beamSpan</a:t>
             </a:r>
             <a:r>
-              <a:rPr lang="en-US" dirty="0" smtClean="0"/>
+              <a:rPr lang="en-US" sz="2400" b="1" dirty="0" smtClean="0"/>
               <a:t>)   / (</a:t>
             </a:r>
             <a:r>
-              <a:rPr lang="en-US" dirty="0" err="1" smtClean="0"/>
+              <a:rPr lang="en-US" sz="2400" b="1" dirty="0" err="1" smtClean="0"/>
               <a:t>beamShear</a:t>
             </a:r>
             <a:r>
-              <a:rPr lang="en-US" dirty="0" smtClean="0"/>
+              <a:rPr lang="en-US" sz="2400" b="1" dirty="0" smtClean="0"/>
               <a:t> * area)));</a:t>
             </a:r>
           </a:p>
           <a:p>
-            <a:endParaRPr lang="en-US" dirty="0" smtClean="0"/>
-          </a:p>
-          <a:p>
-            <a:endParaRPr lang="en-US" dirty="0"/>
+            <a:endParaRPr lang="en-US" b="1" dirty="0" smtClean="0"/>
+          </a:p>
+          <a:p>
+            <a:endParaRPr lang="en-US" b="1" dirty="0"/>
           </a:p>
         </p:txBody>
       </p:sp>
@@ -4326,49 +4282,49 @@
           <a:lstStyle/>
           <a:p>
             <a:r>
-              <a:rPr lang="en-US" dirty="0" err="1" smtClean="0"/>
+              <a:rPr lang="en-US" b="1" dirty="0" err="1" smtClean="0"/>
               <a:t>MessageBox.Show</a:t>
             </a:r>
             <a:r>
-              <a:rPr lang="en-US" dirty="0" smtClean="0"/>
+              <a:rPr lang="en-US" b="1" dirty="0" smtClean="0"/>
               <a:t>("All entries must be positive numbers.", "Error", </a:t>
             </a:r>
             <a:r>
-              <a:rPr lang="en-US" dirty="0" err="1" smtClean="0"/>
+              <a:rPr lang="en-US" b="1" dirty="0" err="1" smtClean="0"/>
               <a:t>MessageBoxButtons.OK</a:t>
             </a:r>
             <a:r>
-              <a:rPr lang="en-US" dirty="0" smtClean="0"/>
+              <a:rPr lang="en-US" b="1" dirty="0" smtClean="0"/>
               <a:t>, 		</a:t>
             </a:r>
             <a:r>
-              <a:rPr lang="en-US" dirty="0" err="1" smtClean="0"/>
+              <a:rPr lang="en-US" b="1" dirty="0" err="1" smtClean="0"/>
               <a:t>MessageBoxIcon.Error</a:t>
             </a:r>
             <a:r>
-              <a:rPr lang="en-US" dirty="0" smtClean="0"/>
+              <a:rPr lang="en-US" b="1" dirty="0" smtClean="0"/>
               <a:t>);</a:t>
             </a:r>
           </a:p>
           <a:p>
             <a:r>
-              <a:rPr lang="en-US" dirty="0" smtClean="0"/>
+              <a:rPr lang="en-US" b="1" dirty="0" smtClean="0"/>
               <a:t>              </a:t>
             </a:r>
             <a:r>
-              <a:rPr lang="en-US" dirty="0" err="1" smtClean="0"/>
+              <a:rPr lang="en-US" b="1" dirty="0" err="1" smtClean="0"/>
               <a:t>resultDisplay.Text</a:t>
             </a:r>
             <a:r>
-              <a:rPr lang="en-US" dirty="0" smtClean="0"/>
+              <a:rPr lang="en-US" b="1" dirty="0" smtClean="0"/>
               <a:t> = </a:t>
             </a:r>
             <a:r>
-              <a:rPr lang="en-US" dirty="0" err="1" smtClean="0"/>
+              <a:rPr lang="en-US" b="1" dirty="0" err="1" smtClean="0"/>
               <a:t>String.Empty</a:t>
             </a:r>
             <a:r>
-              <a:rPr lang="en-US" dirty="0" smtClean="0"/>
+              <a:rPr lang="en-US" b="1" dirty="0" smtClean="0"/>
               <a:t>;</a:t>
             </a:r>
           </a:p>
@@ -4376,61 +4332,61 @@
             <a:pPr>
               <a:buNone/>
             </a:pPr>
-            <a:endParaRPr lang="en-US" dirty="0" smtClean="0"/>
-          </a:p>
-          <a:p>
-            <a:r>
-              <a:rPr lang="en-US" dirty="0" err="1" smtClean="0"/>
+            <a:endParaRPr lang="en-US" b="1" dirty="0" smtClean="0"/>
+          </a:p>
+          <a:p>
+            <a:r>
+              <a:rPr lang="en-US" b="1" dirty="0" err="1" smtClean="0"/>
               <a:t>MessageBox.Show</a:t>
             </a:r>
             <a:r>
-              <a:rPr lang="en-US" dirty="0" smtClean="0"/>
+              <a:rPr lang="en-US" b="1" dirty="0" smtClean="0"/>
               <a:t>("Wood type " + </a:t>
             </a:r>
             <a:r>
-              <a:rPr lang="en-US" dirty="0" err="1" smtClean="0"/>
+              <a:rPr lang="en-US" b="1" dirty="0" err="1" smtClean="0"/>
               <a:t>wood.TreeName</a:t>
             </a:r>
             <a:r>
-              <a:rPr lang="en-US" dirty="0" smtClean="0"/>
+              <a:rPr lang="en-US" b="1" dirty="0" smtClean="0"/>
               <a:t> + " has no beam shear for specified grain 		type and moisture content.", "Error", </a:t>
             </a:r>
             <a:r>
-              <a:rPr lang="en-US" dirty="0" err="1" smtClean="0"/>
+              <a:rPr lang="en-US" b="1" dirty="0" err="1" smtClean="0"/>
               <a:t>MessageBoxButtons.OK</a:t>
             </a:r>
             <a:r>
-              <a:rPr lang="en-US" dirty="0" smtClean="0"/>
+              <a:rPr lang="en-US" b="1" dirty="0" smtClean="0"/>
               <a:t>, </a:t>
             </a:r>
             <a:r>
-              <a:rPr lang="en-US" dirty="0" err="1" smtClean="0"/>
+              <a:rPr lang="en-US" b="1" dirty="0" err="1" smtClean="0"/>
               <a:t>MessageBoxIcon.Error</a:t>
             </a:r>
             <a:r>
-              <a:rPr lang="en-US" dirty="0" smtClean="0"/>
+              <a:rPr lang="en-US" b="1" dirty="0" smtClean="0"/>
               <a:t>);</a:t>
             </a:r>
           </a:p>
           <a:p>
             <a:r>
-              <a:rPr lang="en-US" dirty="0" smtClean="0"/>
+              <a:rPr lang="en-US" b="1" dirty="0" smtClean="0"/>
               <a:t>               </a:t>
             </a:r>
             <a:r>
-              <a:rPr lang="en-US" dirty="0" err="1" smtClean="0"/>
+              <a:rPr lang="en-US" b="1" dirty="0" err="1" smtClean="0"/>
               <a:t>resultDisplay.Text</a:t>
             </a:r>
             <a:r>
-              <a:rPr lang="en-US" dirty="0" smtClean="0"/>
+              <a:rPr lang="en-US" b="1" dirty="0" smtClean="0"/>
               <a:t> = </a:t>
             </a:r>
             <a:r>
-              <a:rPr lang="en-US" dirty="0" err="1" smtClean="0"/>
+              <a:rPr lang="en-US" b="1" dirty="0" err="1" smtClean="0"/>
               <a:t>String.Empty</a:t>
             </a:r>
             <a:r>
-              <a:rPr lang="en-US" dirty="0" smtClean="0"/>
+              <a:rPr lang="en-US" b="1" dirty="0" smtClean="0"/>
               <a:t>;</a:t>
             </a:r>
           </a:p>
@@ -4522,11 +4478,7 @@
           <a:p>
             <a:r>
               <a:rPr lang="en-US" dirty="0" smtClean="0"/>
-              <a:t>Methodology</a:t>
-            </a:r>
-            <a:r>
-              <a:rPr lang="en-US" dirty="0" smtClean="0"/>
-              <a:t>?</a:t>
+              <a:t>Methodology?</a:t>
             </a:r>
           </a:p>
           <a:p>
@@ -4535,7 +4487,6 @@
               <a:rPr lang="en-US" dirty="0" smtClean="0"/>
               <a:t>Rapid Prototyping</a:t>
             </a:r>
-            <a:endParaRPr lang="en-US" dirty="0" smtClean="0"/>
           </a:p>
           <a:p>
             <a:endParaRPr lang="en-US" dirty="0"/>
@@ -4545,7 +4496,7 @@
     </p:spTree>
     <p:extLst>
       <p:ext uri="{BB962C8B-B14F-4D97-AF65-F5344CB8AC3E}">
-        <p14:creationId xmlns:p14="http://schemas.microsoft.com/office/powerpoint/2010/main" val="248198263"/>
+        <p14:creationId xmlns:p14="http://schemas.microsoft.com/office/powerpoint/2010/main" xmlns="" val="248198263"/>
       </p:ext>
     </p:extLst>
   </p:cSld>
@@ -4675,7 +4626,7 @@
     </p:spTree>
     <p:extLst>
       <p:ext uri="{BB962C8B-B14F-4D97-AF65-F5344CB8AC3E}">
-        <p14:creationId xmlns:p14="http://schemas.microsoft.com/office/powerpoint/2010/main" val="2700358313"/>
+        <p14:creationId xmlns:p14="http://schemas.microsoft.com/office/powerpoint/2010/main" xmlns="" val="2700358313"/>
       </p:ext>
     </p:extLst>
   </p:cSld>
@@ -4832,7 +4783,7 @@
     </p:spTree>
     <p:extLst>
       <p:ext uri="{BB962C8B-B14F-4D97-AF65-F5344CB8AC3E}">
-        <p14:creationId xmlns:p14="http://schemas.microsoft.com/office/powerpoint/2010/main" val="2029206957"/>
+        <p14:creationId xmlns:p14="http://schemas.microsoft.com/office/powerpoint/2010/main" xmlns="" val="2029206957"/>
       </p:ext>
     </p:extLst>
   </p:cSld>
@@ -4956,7 +4907,7 @@
     </p:spTree>
     <p:extLst>
       <p:ext uri="{BB962C8B-B14F-4D97-AF65-F5344CB8AC3E}">
-        <p14:creationId xmlns:p14="http://schemas.microsoft.com/office/powerpoint/2010/main" val="921941208"/>
+        <p14:creationId xmlns:p14="http://schemas.microsoft.com/office/powerpoint/2010/main" xmlns="" val="921941208"/>
       </p:ext>
     </p:extLst>
   </p:cSld>
@@ -5062,7 +5013,7 @@
     </p:spTree>
     <p:extLst>
       <p:ext uri="{BB962C8B-B14F-4D97-AF65-F5344CB8AC3E}">
-        <p14:creationId xmlns:p14="http://schemas.microsoft.com/office/powerpoint/2010/main" val="2763518482"/>
+        <p14:creationId xmlns:p14="http://schemas.microsoft.com/office/powerpoint/2010/main" xmlns="" val="2763518482"/>
       </p:ext>
     </p:extLst>
   </p:cSld>
@@ -5146,7 +5097,7 @@
     </p:spTree>
     <p:extLst>
       <p:ext uri="{BB962C8B-B14F-4D97-AF65-F5344CB8AC3E}">
-        <p14:creationId xmlns:p14="http://schemas.microsoft.com/office/powerpoint/2010/main" val="2337029756"/>
+        <p14:creationId xmlns:p14="http://schemas.microsoft.com/office/powerpoint/2010/main" xmlns="" val="2337029756"/>
       </p:ext>
     </p:extLst>
   </p:cSld>
@@ -5234,7 +5185,7 @@
     </p:spTree>
     <p:extLst>
       <p:ext uri="{BB962C8B-B14F-4D97-AF65-F5344CB8AC3E}">
-        <p14:creationId xmlns:p14="http://schemas.microsoft.com/office/powerpoint/2010/main" val="81708855"/>
+        <p14:creationId xmlns:p14="http://schemas.microsoft.com/office/powerpoint/2010/main" xmlns="" val="81708855"/>
       </p:ext>
     </p:extLst>
   </p:cSld>
@@ -5617,7 +5568,7 @@
   <a:extraClrSchemeLst/>
   <a:extLst>
     <a:ext uri="{05A4C25C-085E-4340-85A3-A5531E510DB2}">
-      <thm15:themeFamily xmlns:thm15="http://schemas.microsoft.com/office/thememl/2012/main" name="Retrospect" id="{5F128B03-DCCA-4EEB-AB3B-CF2899314A46}" vid="{3F1AAB62-24C6-49D2-8E01-B56FAC9A3DCD}"/>
+      <thm15:themeFamily xmlns:thm15="http://schemas.microsoft.com/office/thememl/2012/main" xmlns="" name="Retrospect" id="{5F128B03-DCCA-4EEB-AB3B-CF2899314A46}" vid="{3F1AAB62-24C6-49D2-8E01-B56FAC9A3DCD}"/>
     </a:ext>
   </a:extLst>
 </a:theme>

</xml_diff>

<commit_message>
Change to 3 decimal places
I changed the density to be displayed for 3 decimal places.
</commit_message>
<xml_diff>
--- a/Implementation/Implementation Team Presentation.pptx
+++ b/Implementation/Implementation Team Presentation.pptx
@@ -9,16 +9,17 @@
     <p:sldId id="257" r:id="rId3"/>
     <p:sldId id="258" r:id="rId4"/>
     <p:sldId id="260" r:id="rId5"/>
-    <p:sldId id="259" r:id="rId6"/>
-    <p:sldId id="265" r:id="rId7"/>
-    <p:sldId id="266" r:id="rId8"/>
-    <p:sldId id="267" r:id="rId9"/>
-    <p:sldId id="268" r:id="rId10"/>
-    <p:sldId id="269" r:id="rId11"/>
-    <p:sldId id="262" r:id="rId12"/>
-    <p:sldId id="261" r:id="rId13"/>
-    <p:sldId id="263" r:id="rId14"/>
-    <p:sldId id="264" r:id="rId15"/>
+    <p:sldId id="271" r:id="rId6"/>
+    <p:sldId id="272" r:id="rId7"/>
+    <p:sldId id="265" r:id="rId8"/>
+    <p:sldId id="266" r:id="rId9"/>
+    <p:sldId id="267" r:id="rId10"/>
+    <p:sldId id="268" r:id="rId11"/>
+    <p:sldId id="269" r:id="rId12"/>
+    <p:sldId id="262" r:id="rId13"/>
+    <p:sldId id="261" r:id="rId14"/>
+    <p:sldId id="263" r:id="rId15"/>
+    <p:sldId id="264" r:id="rId16"/>
   </p:sldIdLst>
   <p:sldSz cx="12192000" cy="6858000"/>
   <p:notesSz cx="6858000" cy="9144000"/>
@@ -363,7 +364,7 @@
             <a:fld id="{4BDF68E2-58F2-4D09-BE8B-E3BD06533059}" type="datetimeFigureOut">
               <a:rPr lang="en-US" dirty="0"/>
               <a:pPr/>
-              <a:t>11/15/2014</a:t>
+              <a:t>11/19/2014</a:t>
             </a:fld>
             <a:endParaRPr lang="en-US" dirty="0"/>
           </a:p>
@@ -568,7 +569,7 @@
             <a:fld id="{2E2D6473-DF6D-4702-B328-E0DD40540A4E}" type="datetimeFigureOut">
               <a:rPr lang="en-US" dirty="0"/>
               <a:pPr/>
-              <a:t>11/15/2014</a:t>
+              <a:t>11/19/2014</a:t>
             </a:fld>
             <a:endParaRPr lang="en-US" dirty="0"/>
           </a:p>
@@ -821,7 +822,7 @@
             <a:fld id="{E26F7E3A-B166-407D-9866-32884E7D5B37}" type="datetimeFigureOut">
               <a:rPr lang="en-US" dirty="0"/>
               <a:pPr/>
-              <a:t>11/15/2014</a:t>
+              <a:t>11/19/2014</a:t>
             </a:fld>
             <a:endParaRPr lang="en-US" dirty="0"/>
           </a:p>
@@ -992,7 +993,7 @@
             <a:fld id="{528FC5F6-F338-4AE4-BB23-26385BCFC423}" type="datetimeFigureOut">
               <a:rPr lang="en-US" dirty="0"/>
               <a:pPr/>
-              <a:t>11/15/2014</a:t>
+              <a:t>11/19/2014</a:t>
             </a:fld>
             <a:endParaRPr lang="en-US" dirty="0"/>
           </a:p>
@@ -1332,7 +1333,7 @@
             <a:fld id="{20EBB0C4-6273-4C6E-B9BD-2EDC30F1CD52}" type="datetimeFigureOut">
               <a:rPr lang="en-US" dirty="0"/>
               <a:pPr/>
-              <a:t>11/15/2014</a:t>
+              <a:t>11/19/2014</a:t>
             </a:fld>
             <a:endParaRPr lang="en-US" dirty="0"/>
           </a:p>
@@ -1604,7 +1605,7 @@
             <a:fld id="{19AB4D41-86C1-4908-B66A-0B50CEB3BF29}" type="datetimeFigureOut">
               <a:rPr lang="en-US" dirty="0"/>
               <a:pPr/>
-              <a:t>11/15/2014</a:t>
+              <a:t>11/19/2014</a:t>
             </a:fld>
             <a:endParaRPr lang="en-US" dirty="0"/>
           </a:p>
@@ -1980,7 +1981,7 @@
             <a:fld id="{E6426E2C-56C1-4E0D-A793-0088A7FDD37E}" type="datetimeFigureOut">
               <a:rPr lang="en-US" dirty="0"/>
               <a:pPr/>
-              <a:t>11/15/2014</a:t>
+              <a:t>11/19/2014</a:t>
             </a:fld>
             <a:endParaRPr lang="en-US" dirty="0"/>
           </a:p>
@@ -2095,7 +2096,7 @@
             <a:fld id="{C8C39B41-D8B5-4052-B551-9B5525EAA8B6}" type="datetimeFigureOut">
               <a:rPr lang="en-US" dirty="0"/>
               <a:pPr/>
-              <a:t>11/15/2014</a:t>
+              <a:t>11/19/2014</a:t>
             </a:fld>
             <a:endParaRPr lang="en-US" dirty="0"/>
           </a:p>
@@ -2263,7 +2264,7 @@
             <a:fld id="{4D94136C-8742-45B2-AF27-D93DF72833A9}" type="datetimeFigureOut">
               <a:rPr lang="en-US" dirty="0"/>
               <a:pPr/>
-              <a:t>11/15/2014</a:t>
+              <a:t>11/19/2014</a:t>
             </a:fld>
             <a:endParaRPr lang="en-US" dirty="0"/>
           </a:p>
@@ -2614,7 +2615,7 @@
             <a:fld id="{32ABBEA6-7C60-4B02-AE87-00D78D8422AF}" type="datetimeFigureOut">
               <a:rPr lang="en-US" dirty="0"/>
               <a:pPr/>
-              <a:t>11/15/2014</a:t>
+              <a:t>11/19/2014</a:t>
             </a:fld>
             <a:endParaRPr lang="en-US" dirty="0"/>
           </a:p>
@@ -2993,7 +2994,7 @@
             <a:fld id="{C9CAD897-D46E-4AD2-BD9B-49DD3E640873}" type="datetimeFigureOut">
               <a:rPr lang="en-US" dirty="0"/>
               <a:pPr/>
-              <a:t>11/15/2014</a:t>
+              <a:t>11/19/2014</a:t>
             </a:fld>
             <a:endParaRPr lang="en-US" dirty="0"/>
           </a:p>
@@ -3277,7 +3278,7 @@
             <a:fld id="{98624D31-43A5-475A-80CF-332C9F6DCF35}" type="datetimeFigureOut">
               <a:rPr lang="en-US" dirty="0"/>
               <a:pPr/>
-              <a:t>11/15/2014</a:t>
+              <a:t>11/19/2014</a:t>
             </a:fld>
             <a:endParaRPr lang="en-US" dirty="0"/>
           </a:p>
@@ -3924,6 +3925,95 @@
           <a:lstStyle/>
           <a:p>
             <a:r>
+              <a:rPr lang="en-US" altLang="zh-CN" dirty="0" smtClean="0"/>
+              <a:t>Density</a:t>
+            </a:r>
+            <a:endParaRPr lang="en-US" dirty="0"/>
+          </a:p>
+        </p:txBody>
+      </p:sp>
+      <p:pic>
+        <p:nvPicPr>
+          <p:cNvPr id="4" name="Content Placeholder 3"/>
+          <p:cNvPicPr>
+            <a:picLocks noGrp="1" noChangeAspect="1"/>
+          </p:cNvPicPr>
+          <p:nvPr>
+            <p:ph idx="1"/>
+          </p:nvPr>
+        </p:nvPicPr>
+        <p:blipFill>
+          <a:blip r:embed="rId2">
+            <a:extLst>
+              <a:ext uri="{28A0092B-C50C-407E-A947-70E740481C1C}">
+                <a14:useLocalDpi xmlns:a14="http://schemas.microsoft.com/office/drawing/2010/main" val="0"/>
+              </a:ext>
+            </a:extLst>
+          </a:blip>
+          <a:stretch>
+            <a:fillRect/>
+          </a:stretch>
+        </p:blipFill>
+        <p:spPr>
+          <a:xfrm>
+            <a:off x="4778187" y="2238149"/>
+            <a:ext cx="2695951" cy="3238952"/>
+          </a:xfrm>
+        </p:spPr>
+      </p:pic>
+    </p:spTree>
+    <p:extLst>
+      <p:ext uri="{BB962C8B-B14F-4D97-AF65-F5344CB8AC3E}">
+        <p14:creationId xmlns:p14="http://schemas.microsoft.com/office/powerpoint/2010/main" val="3922382855"/>
+      </p:ext>
+    </p:extLst>
+  </p:cSld>
+  <p:clrMapOvr>
+    <a:masterClrMapping/>
+  </p:clrMapOvr>
+  <p:timing>
+    <p:tnLst>
+      <p:par>
+        <p:cTn id="1" dur="indefinite" restart="never" nodeType="tmRoot"/>
+      </p:par>
+    </p:tnLst>
+  </p:timing>
+</p:sld>
+</file>
+
+<file path=ppt/slides/slide11.xml><?xml version="1.0" encoding="utf-8"?>
+<p:sld xmlns:a="http://schemas.openxmlformats.org/drawingml/2006/main" xmlns:r="http://schemas.openxmlformats.org/officeDocument/2006/relationships" xmlns:p="http://schemas.openxmlformats.org/presentationml/2006/main">
+  <p:cSld>
+    <p:spTree>
+      <p:nvGrpSpPr>
+        <p:cNvPr id="1" name=""/>
+        <p:cNvGrpSpPr/>
+        <p:nvPr/>
+      </p:nvGrpSpPr>
+      <p:grpSpPr>
+        <a:xfrm>
+          <a:off x="0" y="0"/>
+          <a:ext cx="0" cy="0"/>
+          <a:chOff x="0" y="0"/>
+          <a:chExt cx="0" cy="0"/>
+        </a:xfrm>
+      </p:grpSpPr>
+      <p:sp>
+        <p:nvSpPr>
+          <p:cNvPr id="2" name="Title 1"/>
+          <p:cNvSpPr>
+            <a:spLocks noGrp="1"/>
+          </p:cNvSpPr>
+          <p:nvPr>
+            <p:ph type="title"/>
+          </p:nvPr>
+        </p:nvSpPr>
+        <p:spPr/>
+        <p:txBody>
+          <a:bodyPr/>
+          <a:lstStyle/>
+          <a:p>
+            <a:r>
               <a:rPr lang="en-US" altLang="zh-CN" dirty="0"/>
               <a:t>Density </a:t>
             </a:r>
@@ -3977,10 +4067,17 @@
   <p:clrMapOvr>
     <a:masterClrMapping/>
   </p:clrMapOvr>
+  <p:timing>
+    <p:tnLst>
+      <p:par>
+        <p:cTn id="1" dur="indefinite" restart="never" nodeType="tmRoot"/>
+      </p:par>
+    </p:tnLst>
+  </p:timing>
 </p:sld>
 </file>
 
-<file path=ppt/slides/slide11.xml><?xml version="1.0" encoding="utf-8"?>
+<file path=ppt/slides/slide12.xml><?xml version="1.0" encoding="utf-8"?>
 <p:sld xmlns:a="http://schemas.openxmlformats.org/drawingml/2006/main" xmlns:r="http://schemas.openxmlformats.org/officeDocument/2006/relationships" xmlns:p="http://schemas.openxmlformats.org/presentationml/2006/main">
   <p:cSld>
     <p:spTree>
@@ -4069,178 +4166,6 @@
 </p:sld>
 </file>
 
-<file path=ppt/slides/slide12.xml><?xml version="1.0" encoding="utf-8"?>
-<p:sld xmlns:a="http://schemas.openxmlformats.org/drawingml/2006/main" xmlns:r="http://schemas.openxmlformats.org/officeDocument/2006/relationships" xmlns:p="http://schemas.openxmlformats.org/presentationml/2006/main">
-  <p:cSld>
-    <p:spTree>
-      <p:nvGrpSpPr>
-        <p:cNvPr id="1" name=""/>
-        <p:cNvGrpSpPr/>
-        <p:nvPr/>
-      </p:nvGrpSpPr>
-      <p:grpSpPr>
-        <a:xfrm>
-          <a:off x="0" y="0"/>
-          <a:ext cx="0" cy="0"/>
-          <a:chOff x="0" y="0"/>
-          <a:chExt cx="0" cy="0"/>
-        </a:xfrm>
-      </p:grpSpPr>
-      <p:sp>
-        <p:nvSpPr>
-          <p:cNvPr id="2" name="Title 1"/>
-          <p:cNvSpPr>
-            <a:spLocks noGrp="1"/>
-          </p:cNvSpPr>
-          <p:nvPr>
-            <p:ph type="title"/>
-          </p:nvPr>
-        </p:nvSpPr>
-        <p:spPr/>
-        <p:txBody>
-          <a:bodyPr/>
-          <a:lstStyle/>
-          <a:p>
-            <a:r>
-              <a:rPr lang="en-US" dirty="0" smtClean="0"/>
-              <a:t>Beam Deflection (cont.)</a:t>
-            </a:r>
-            <a:endParaRPr lang="en-US" dirty="0"/>
-          </a:p>
-        </p:txBody>
-      </p:sp>
-      <p:sp>
-        <p:nvSpPr>
-          <p:cNvPr id="3" name="Content Placeholder 2"/>
-          <p:cNvSpPr>
-            <a:spLocks noGrp="1"/>
-          </p:cNvSpPr>
-          <p:nvPr>
-            <p:ph idx="1"/>
-          </p:nvPr>
-        </p:nvSpPr>
-        <p:spPr/>
-        <p:txBody>
-          <a:bodyPr>
-            <a:noAutofit/>
-          </a:bodyPr>
-          <a:lstStyle/>
-          <a:p>
-            <a:r>
-              <a:rPr lang="en-US" sz="1600" b="1" dirty="0" smtClean="0"/>
-              <a:t>//KB and KS constants</a:t>
-            </a:r>
-          </a:p>
-          <a:p>
-            <a:r>
-              <a:rPr lang="en-US" sz="1600" b="1" dirty="0" smtClean="0"/>
-              <a:t>const double KB = 0.020833333333;	// 1/48</a:t>
-            </a:r>
-          </a:p>
-          <a:p>
-            <a:r>
-              <a:rPr lang="en-US" sz="1600" b="1" dirty="0" smtClean="0"/>
-              <a:t>const double KS = 0.25;		// 1/4</a:t>
-            </a:r>
-          </a:p>
-          <a:p>
-            <a:r>
-              <a:rPr lang="en-US" sz="1600" b="1" dirty="0" smtClean="0"/>
-              <a:t>		</a:t>
-            </a:r>
-          </a:p>
-          <a:p>
-            <a:r>
-              <a:rPr lang="en-US" sz="1600" b="1" dirty="0" smtClean="0"/>
-              <a:t>//Calculate beam moment of inertia</a:t>
-            </a:r>
-          </a:p>
-          <a:p>
-            <a:r>
-              <a:rPr lang="en-US" sz="1600" b="1" dirty="0" smtClean="0"/>
-              <a:t>// I = (b * h^3) / 12</a:t>
-            </a:r>
-          </a:p>
-          <a:p>
-            <a:r>
-              <a:rPr lang="en-US" sz="1600" b="1" dirty="0" smtClean="0"/>
-              <a:t>double inertia = (</a:t>
-            </a:r>
-            <a:r>
-              <a:rPr lang="en-US" sz="1600" b="1" dirty="0" err="1" smtClean="0"/>
-              <a:t>beamWidth</a:t>
-            </a:r>
-            <a:r>
-              <a:rPr lang="en-US" sz="1600" b="1" dirty="0" smtClean="0"/>
-              <a:t> * </a:t>
-            </a:r>
-            <a:r>
-              <a:rPr lang="en-US" sz="1600" b="1" dirty="0" err="1" smtClean="0"/>
-              <a:t>Math.Pow</a:t>
-            </a:r>
-            <a:r>
-              <a:rPr lang="en-US" sz="1600" b="1" dirty="0" smtClean="0"/>
-              <a:t>(beamDepth,3) / 12);</a:t>
-            </a:r>
-          </a:p>
-          <a:p>
-            <a:r>
-              <a:rPr lang="en-US" sz="1600" b="1" dirty="0" smtClean="0"/>
-              <a:t>				</a:t>
-            </a:r>
-          </a:p>
-          <a:p>
-            <a:r>
-              <a:rPr lang="en-US" sz="1600" b="1" dirty="0" smtClean="0"/>
-              <a:t>//Calculate the modified beam area</a:t>
-            </a:r>
-          </a:p>
-          <a:p>
-            <a:r>
-              <a:rPr lang="en-US" sz="1600" b="1" dirty="0" smtClean="0"/>
-              <a:t>// A` = 5/6 * b * h				</a:t>
-            </a:r>
-          </a:p>
-          <a:p>
-            <a:r>
-              <a:rPr lang="en-US" sz="1600" b="1" dirty="0" smtClean="0"/>
-              <a:t>double area = (5.0 / 6.0) * </a:t>
-            </a:r>
-            <a:r>
-              <a:rPr lang="en-US" sz="1600" b="1" dirty="0" err="1" smtClean="0"/>
-              <a:t>beamWidth</a:t>
-            </a:r>
-            <a:r>
-              <a:rPr lang="en-US" sz="1600" b="1" dirty="0" smtClean="0"/>
-              <a:t> * </a:t>
-            </a:r>
-            <a:r>
-              <a:rPr lang="en-US" sz="1600" b="1" dirty="0" err="1" smtClean="0"/>
-              <a:t>beamDepth</a:t>
-            </a:r>
-            <a:r>
-              <a:rPr lang="en-US" sz="1600" b="1" dirty="0" smtClean="0"/>
-              <a:t>;</a:t>
-            </a:r>
-            <a:endParaRPr lang="en-US" sz="1600" b="1" dirty="0"/>
-          </a:p>
-        </p:txBody>
-      </p:sp>
-    </p:spTree>
-  </p:cSld>
-  <p:clrMapOvr>
-    <a:masterClrMapping/>
-  </p:clrMapOvr>
-  <p:timing>
-    <p:tnLst>
-      <p:par>
-        <p:cTn id="1" dur="indefinite" restart="never" nodeType="tmRoot"/>
-      </p:par>
-    </p:tnLst>
-  </p:timing>
-</p:sld>
-</file>
-
 <file path=ppt/slides/slide13.xml><?xml version="1.0" encoding="utf-8"?>
 <p:sld xmlns:a="http://schemas.openxmlformats.org/drawingml/2006/main" xmlns:r="http://schemas.openxmlformats.org/officeDocument/2006/relationships" xmlns:p="http://schemas.openxmlformats.org/presentationml/2006/main">
   <p:cSld>
@@ -4294,94 +4219,107 @@
         <p:spPr/>
         <p:txBody>
           <a:bodyPr>
-            <a:normAutofit/>
+            <a:noAutofit/>
           </a:bodyPr>
           <a:lstStyle/>
           <a:p>
             <a:r>
-              <a:rPr lang="en-US" sz="2400" b="1" dirty="0" smtClean="0"/>
-              <a:t>//Calculate beam deflection</a:t>
-            </a:r>
-          </a:p>
-          <a:p>
-            <a:r>
-              <a:rPr lang="en-US" sz="2400" b="1" dirty="0" smtClean="0"/>
-              <a:t>// </a:t>
-            </a:r>
-            <a:r>
-              <a:rPr lang="en-US" sz="2400" b="1" dirty="0" err="1" smtClean="0"/>
-              <a:t>beamDeflection</a:t>
-            </a:r>
-            <a:r>
-              <a:rPr lang="en-US" sz="2400" b="1" dirty="0" smtClean="0"/>
-              <a:t> = ((( KB * W * L^3 ) / (E * I )) + (( KS * W * L) / ( G * A` )))</a:t>
-            </a:r>
-          </a:p>
-          <a:p>
-            <a:r>
-              <a:rPr lang="en-US" sz="2400" b="1" dirty="0" smtClean="0"/>
-              <a:t>return (((KB * </a:t>
-            </a:r>
-            <a:r>
-              <a:rPr lang="en-US" sz="2400" b="1" dirty="0" err="1" smtClean="0"/>
-              <a:t>beamLoad</a:t>
-            </a:r>
-            <a:r>
-              <a:rPr lang="en-US" sz="2400" b="1" dirty="0" smtClean="0"/>
+              <a:rPr lang="en-US" sz="1600" b="1" dirty="0" smtClean="0"/>
+              <a:t>//KB and KS constants</a:t>
+            </a:r>
+          </a:p>
+          <a:p>
+            <a:r>
+              <a:rPr lang="en-US" sz="1600" b="1" dirty="0" smtClean="0"/>
+              <a:t>const double KB = 0.020833333333;	// 1/48</a:t>
+            </a:r>
+          </a:p>
+          <a:p>
+            <a:r>
+              <a:rPr lang="en-US" sz="1600" b="1" dirty="0" smtClean="0"/>
+              <a:t>const double KS = 0.25;		// 1/4</a:t>
+            </a:r>
+          </a:p>
+          <a:p>
+            <a:r>
+              <a:rPr lang="en-US" sz="1600" b="1" dirty="0" smtClean="0"/>
+              <a:t>		</a:t>
+            </a:r>
+          </a:p>
+          <a:p>
+            <a:r>
+              <a:rPr lang="en-US" sz="1600" b="1" dirty="0" smtClean="0"/>
+              <a:t>//Calculate beam moment of inertia</a:t>
+            </a:r>
+          </a:p>
+          <a:p>
+            <a:r>
+              <a:rPr lang="en-US" sz="1600" b="1" dirty="0" smtClean="0"/>
+              <a:t>// I = (b * h^3) / 12</a:t>
+            </a:r>
+          </a:p>
+          <a:p>
+            <a:r>
+              <a:rPr lang="en-US" sz="1600" b="1" dirty="0" smtClean="0"/>
+              <a:t>double inertia = (</a:t>
+            </a:r>
+            <a:r>
+              <a:rPr lang="en-US" sz="1600" b="1" dirty="0" err="1" smtClean="0"/>
+              <a:t>beamWidth</a:t>
+            </a:r>
+            <a:r>
+              <a:rPr lang="en-US" sz="1600" b="1" dirty="0" smtClean="0"/>
               <a:t> * </a:t>
             </a:r>
             <a:r>
-              <a:rPr lang="en-US" sz="2400" b="1" dirty="0" err="1" smtClean="0"/>
+              <a:rPr lang="en-US" sz="1600" b="1" dirty="0" err="1" smtClean="0"/>
               <a:t>Math.Pow</a:t>
             </a:r>
             <a:r>
-              <a:rPr lang="en-US" sz="2400" b="1" dirty="0" smtClean="0"/>
-              <a:t>(</a:t>
-            </a:r>
-            <a:r>
-              <a:rPr lang="en-US" sz="2400" b="1" dirty="0" err="1" smtClean="0"/>
-              <a:t>beamSpan</a:t>
-            </a:r>
-            <a:r>
-              <a:rPr lang="en-US" sz="2400" b="1" dirty="0" smtClean="0"/>
-              <a:t>, 3)) / (elasticity * inertia)) +</a:t>
-            </a:r>
-          </a:p>
-          <a:p>
-            <a:r>
-              <a:rPr lang="en-US" sz="2400" b="1" dirty="0" smtClean="0"/>
-              <a:t>	((KS * </a:t>
-            </a:r>
-            <a:r>
-              <a:rPr lang="en-US" sz="2400" b="1" dirty="0" err="1" smtClean="0"/>
-              <a:t>beamLoad</a:t>
-            </a:r>
-            <a:r>
-              <a:rPr lang="en-US" sz="2400" b="1" dirty="0" smtClean="0"/>
+              <a:rPr lang="en-US" sz="1600" b="1" dirty="0" smtClean="0"/>
+              <a:t>(beamDepth,3) / 12);</a:t>
+            </a:r>
+          </a:p>
+          <a:p>
+            <a:r>
+              <a:rPr lang="en-US" sz="1600" b="1" dirty="0" smtClean="0"/>
+              <a:t>				</a:t>
+            </a:r>
+          </a:p>
+          <a:p>
+            <a:r>
+              <a:rPr lang="en-US" sz="1600" b="1" dirty="0" smtClean="0"/>
+              <a:t>//Calculate the modified beam area</a:t>
+            </a:r>
+          </a:p>
+          <a:p>
+            <a:r>
+              <a:rPr lang="en-US" sz="1600" b="1" dirty="0" smtClean="0"/>
+              <a:t>// A` = 5/6 * b * h				</a:t>
+            </a:r>
+          </a:p>
+          <a:p>
+            <a:r>
+              <a:rPr lang="en-US" sz="1600" b="1" dirty="0" smtClean="0"/>
+              <a:t>double area = (5.0 / 6.0) * </a:t>
+            </a:r>
+            <a:r>
+              <a:rPr lang="en-US" sz="1600" b="1" dirty="0" err="1" smtClean="0"/>
+              <a:t>beamWidth</a:t>
+            </a:r>
+            <a:r>
+              <a:rPr lang="en-US" sz="1600" b="1" dirty="0" smtClean="0"/>
               <a:t> * </a:t>
             </a:r>
             <a:r>
-              <a:rPr lang="en-US" sz="2400" b="1" dirty="0" err="1" smtClean="0"/>
-              <a:t>beamSpan</a:t>
-            </a:r>
-            <a:r>
-              <a:rPr lang="en-US" sz="2400" b="1" dirty="0" smtClean="0"/>
-              <a:t>)   / (</a:t>
-            </a:r>
-            <a:r>
-              <a:rPr lang="en-US" sz="2400" b="1" dirty="0" err="1" smtClean="0"/>
-              <a:t>beamShear</a:t>
-            </a:r>
-            <a:r>
-              <a:rPr lang="en-US" sz="2400" b="1" dirty="0" smtClean="0"/>
-              <a:t> * area)));</a:t>
-            </a:r>
-          </a:p>
-          <a:p>
-            <a:endParaRPr lang="en-US" b="1" dirty="0" smtClean="0"/>
-          </a:p>
-          <a:p>
-            <a:endParaRPr lang="en-US" b="1" dirty="0"/>
+              <a:rPr lang="en-US" sz="1600" b="1" dirty="0" err="1" smtClean="0"/>
+              <a:t>beamDepth</a:t>
+            </a:r>
+            <a:r>
+              <a:rPr lang="en-US" sz="1600" b="1" dirty="0" smtClean="0"/>
+              <a:t>;</a:t>
+            </a:r>
+            <a:endParaRPr lang="en-US" sz="1600" b="1" dirty="0"/>
           </a:p>
         </p:txBody>
       </p:sp>
@@ -4458,6 +4396,165 @@
           <a:lstStyle/>
           <a:p>
             <a:r>
+              <a:rPr lang="en-US" sz="2400" b="1" dirty="0" smtClean="0"/>
+              <a:t>//Calculate beam deflection</a:t>
+            </a:r>
+          </a:p>
+          <a:p>
+            <a:r>
+              <a:rPr lang="en-US" sz="2400" b="1" dirty="0" smtClean="0"/>
+              <a:t>// </a:t>
+            </a:r>
+            <a:r>
+              <a:rPr lang="en-US" sz="2400" b="1" dirty="0" err="1" smtClean="0"/>
+              <a:t>beamDeflection</a:t>
+            </a:r>
+            <a:r>
+              <a:rPr lang="en-US" sz="2400" b="1" dirty="0" smtClean="0"/>
+              <a:t> = ((( KB * W * L^3 ) / (E * I )) + (( KS * W * L) / ( G * A` )))</a:t>
+            </a:r>
+          </a:p>
+          <a:p>
+            <a:r>
+              <a:rPr lang="en-US" sz="2400" b="1" dirty="0" smtClean="0"/>
+              <a:t>return (((KB * </a:t>
+            </a:r>
+            <a:r>
+              <a:rPr lang="en-US" sz="2400" b="1" dirty="0" err="1" smtClean="0"/>
+              <a:t>beamLoad</a:t>
+            </a:r>
+            <a:r>
+              <a:rPr lang="en-US" sz="2400" b="1" dirty="0" smtClean="0"/>
+              <a:t> * </a:t>
+            </a:r>
+            <a:r>
+              <a:rPr lang="en-US" sz="2400" b="1" dirty="0" err="1" smtClean="0"/>
+              <a:t>Math.Pow</a:t>
+            </a:r>
+            <a:r>
+              <a:rPr lang="en-US" sz="2400" b="1" dirty="0" smtClean="0"/>
+              <a:t>(</a:t>
+            </a:r>
+            <a:r>
+              <a:rPr lang="en-US" sz="2400" b="1" dirty="0" err="1" smtClean="0"/>
+              <a:t>beamSpan</a:t>
+            </a:r>
+            <a:r>
+              <a:rPr lang="en-US" sz="2400" b="1" dirty="0" smtClean="0"/>
+              <a:t>, 3)) / (elasticity * inertia)) +</a:t>
+            </a:r>
+          </a:p>
+          <a:p>
+            <a:r>
+              <a:rPr lang="en-US" sz="2400" b="1" dirty="0" smtClean="0"/>
+              <a:t>	((KS * </a:t>
+            </a:r>
+            <a:r>
+              <a:rPr lang="en-US" sz="2400" b="1" dirty="0" err="1" smtClean="0"/>
+              <a:t>beamLoad</a:t>
+            </a:r>
+            <a:r>
+              <a:rPr lang="en-US" sz="2400" b="1" dirty="0" smtClean="0"/>
+              <a:t> * </a:t>
+            </a:r>
+            <a:r>
+              <a:rPr lang="en-US" sz="2400" b="1" dirty="0" err="1" smtClean="0"/>
+              <a:t>beamSpan</a:t>
+            </a:r>
+            <a:r>
+              <a:rPr lang="en-US" sz="2400" b="1" dirty="0" smtClean="0"/>
+              <a:t>)   / (</a:t>
+            </a:r>
+            <a:r>
+              <a:rPr lang="en-US" sz="2400" b="1" dirty="0" err="1" smtClean="0"/>
+              <a:t>beamShear</a:t>
+            </a:r>
+            <a:r>
+              <a:rPr lang="en-US" sz="2400" b="1" dirty="0" smtClean="0"/>
+              <a:t> * area)));</a:t>
+            </a:r>
+          </a:p>
+          <a:p>
+            <a:endParaRPr lang="en-US" b="1" dirty="0" smtClean="0"/>
+          </a:p>
+          <a:p>
+            <a:endParaRPr lang="en-US" b="1" dirty="0"/>
+          </a:p>
+        </p:txBody>
+      </p:sp>
+    </p:spTree>
+  </p:cSld>
+  <p:clrMapOvr>
+    <a:masterClrMapping/>
+  </p:clrMapOvr>
+  <p:timing>
+    <p:tnLst>
+      <p:par>
+        <p:cTn id="1" dur="indefinite" restart="never" nodeType="tmRoot"/>
+      </p:par>
+    </p:tnLst>
+  </p:timing>
+</p:sld>
+</file>
+
+<file path=ppt/slides/slide15.xml><?xml version="1.0" encoding="utf-8"?>
+<p:sld xmlns:a="http://schemas.openxmlformats.org/drawingml/2006/main" xmlns:r="http://schemas.openxmlformats.org/officeDocument/2006/relationships" xmlns:p="http://schemas.openxmlformats.org/presentationml/2006/main">
+  <p:cSld>
+    <p:spTree>
+      <p:nvGrpSpPr>
+        <p:cNvPr id="1" name=""/>
+        <p:cNvGrpSpPr/>
+        <p:nvPr/>
+      </p:nvGrpSpPr>
+      <p:grpSpPr>
+        <a:xfrm>
+          <a:off x="0" y="0"/>
+          <a:ext cx="0" cy="0"/>
+          <a:chOff x="0" y="0"/>
+          <a:chExt cx="0" cy="0"/>
+        </a:xfrm>
+      </p:grpSpPr>
+      <p:sp>
+        <p:nvSpPr>
+          <p:cNvPr id="2" name="Title 1"/>
+          <p:cNvSpPr>
+            <a:spLocks noGrp="1"/>
+          </p:cNvSpPr>
+          <p:nvPr>
+            <p:ph type="title"/>
+          </p:nvPr>
+        </p:nvSpPr>
+        <p:spPr/>
+        <p:txBody>
+          <a:bodyPr/>
+          <a:lstStyle/>
+          <a:p>
+            <a:r>
+              <a:rPr lang="en-US" dirty="0" smtClean="0"/>
+              <a:t>Beam Deflection (cont.)</a:t>
+            </a:r>
+            <a:endParaRPr lang="en-US" dirty="0"/>
+          </a:p>
+        </p:txBody>
+      </p:sp>
+      <p:sp>
+        <p:nvSpPr>
+          <p:cNvPr id="3" name="Content Placeholder 2"/>
+          <p:cNvSpPr>
+            <a:spLocks noGrp="1"/>
+          </p:cNvSpPr>
+          <p:nvPr>
+            <p:ph idx="1"/>
+          </p:nvPr>
+        </p:nvSpPr>
+        <p:spPr/>
+        <p:txBody>
+          <a:bodyPr>
+            <a:normAutofit/>
+          </a:bodyPr>
+          <a:lstStyle/>
+          <a:p>
+            <a:r>
               <a:rPr lang="en-US" b="1" dirty="0" err="1" smtClean="0"/>
               <a:t>MessageBox.Show</a:t>
             </a:r>
@@ -4661,7 +4758,56 @@
             <a:pPr lvl="1"/>
             <a:r>
               <a:rPr lang="en-US" dirty="0" smtClean="0"/>
-              <a:t>Rapid Prototyping</a:t>
+              <a:t>Rapid </a:t>
+            </a:r>
+            <a:r>
+              <a:rPr lang="en-US" dirty="0" smtClean="0"/>
+              <a:t>Prototyping</a:t>
+            </a:r>
+          </a:p>
+          <a:p>
+            <a:pPr marL="0" indent="0">
+              <a:buNone/>
+            </a:pPr>
+            <a:r>
+              <a:rPr lang="en-US" dirty="0"/>
+              <a:t> </a:t>
+            </a:r>
+            <a:r>
+              <a:rPr lang="en-US" dirty="0"/>
+              <a:t> </a:t>
+            </a:r>
+            <a:r>
+              <a:rPr lang="en-US" dirty="0" smtClean="0"/>
+              <a:t>How we split up the work?</a:t>
+            </a:r>
+          </a:p>
+          <a:p>
+            <a:pPr lvl="1"/>
+            <a:r>
+              <a:rPr lang="en-US" dirty="0"/>
+              <a:t>Nick – Dimensional change calculation</a:t>
+            </a:r>
+          </a:p>
+          <a:p>
+            <a:pPr lvl="1"/>
+            <a:r>
+              <a:rPr lang="en-US" dirty="0"/>
+              <a:t>Chris – Density calculation</a:t>
+            </a:r>
+          </a:p>
+          <a:p>
+            <a:pPr lvl="1"/>
+            <a:r>
+              <a:rPr lang="en-US" dirty="0"/>
+              <a:t>Eric – Beam deflection calculation</a:t>
+            </a:r>
+          </a:p>
+          <a:p>
+            <a:pPr lvl="1"/>
+            <a:r>
+              <a:rPr lang="en-US" dirty="0"/>
+              <a:t>Josh – database, displaying categories, species, and species description</a:t>
             </a:r>
           </a:p>
           <a:p>
@@ -4788,8 +4934,13 @@
             <a:pPr lvl="1"/>
             <a:r>
               <a:rPr lang="en-US" sz="2400" dirty="0" smtClean="0"/>
-              <a:t>Where to store at?</a:t>
-            </a:r>
+              <a:t>Where to store </a:t>
+            </a:r>
+            <a:r>
+              <a:rPr lang="en-US" sz="2400" dirty="0" smtClean="0"/>
+              <a:t>at</a:t>
+            </a:r>
+            <a:endParaRPr lang="en-US" sz="2400" dirty="0" smtClean="0"/>
           </a:p>
           <a:p>
             <a:pPr marL="201168" lvl="1" indent="0">
@@ -5008,82 +5159,53 @@
           <a:bodyPr/>
           <a:lstStyle/>
           <a:p>
-            <a:pPr algn="ctr"/>
             <a:r>
               <a:rPr lang="en-US" dirty="0" smtClean="0"/>
-              <a:t>How did we split up the work?</a:t>
-            </a:r>
-            <a:endParaRPr lang="en-US" dirty="0"/>
-          </a:p>
-        </p:txBody>
-      </p:sp>
-      <p:sp>
-        <p:nvSpPr>
-          <p:cNvPr id="3" name="Content Placeholder 2"/>
-          <p:cNvSpPr>
-            <a:spLocks noGrp="1"/>
-          </p:cNvSpPr>
-          <p:nvPr>
-            <p:ph idx="1"/>
-          </p:nvPr>
-        </p:nvSpPr>
-        <p:spPr/>
-        <p:txBody>
-          <a:bodyPr/>
-          <a:lstStyle/>
-          <a:p>
-            <a:r>
-              <a:rPr lang="en-US" dirty="0" smtClean="0"/>
-              <a:t>Split up each of the calculations</a:t>
-            </a:r>
-            <a:endParaRPr lang="en-US" dirty="0"/>
-          </a:p>
-          <a:p>
-            <a:pPr lvl="1"/>
-            <a:r>
-              <a:rPr lang="en-US" dirty="0" smtClean="0"/>
-              <a:t>Nick – Dimensional change calculation</a:t>
-            </a:r>
-          </a:p>
-          <a:p>
-            <a:pPr lvl="1"/>
-            <a:r>
-              <a:rPr lang="en-US" dirty="0" smtClean="0"/>
-              <a:t>Chris – Density calculation</a:t>
-            </a:r>
-          </a:p>
-          <a:p>
-            <a:pPr lvl="1"/>
-            <a:r>
-              <a:rPr lang="en-US" dirty="0" smtClean="0"/>
-              <a:t>Eric – Beam deflection calculation</a:t>
-            </a:r>
-          </a:p>
-          <a:p>
-            <a:pPr lvl="1"/>
-            <a:r>
-              <a:rPr lang="en-US" dirty="0" smtClean="0"/>
-              <a:t>Josh – database, displaying categories, species, and species description</a:t>
-            </a:r>
-          </a:p>
-          <a:p>
-            <a:pPr marL="201168" lvl="1" indent="0">
-              <a:buNone/>
-            </a:pPr>
-            <a:endParaRPr lang="en-US" dirty="0"/>
-          </a:p>
-          <a:p>
-            <a:pPr marL="201168" lvl="1" indent="0">
-              <a:buNone/>
-            </a:pPr>
-            <a:endParaRPr lang="en-US" dirty="0" smtClean="0"/>
-          </a:p>
-        </p:txBody>
-      </p:sp>
+              <a:t>ERD Diagram</a:t>
+            </a:r>
+            <a:endParaRPr lang="en-US" dirty="0"/>
+          </a:p>
+        </p:txBody>
+      </p:sp>
+      <p:pic>
+        <p:nvPicPr>
+          <p:cNvPr id="3" name="Picture 2"/>
+          <p:cNvPicPr/>
+          <p:nvPr/>
+        </p:nvPicPr>
+        <p:blipFill rotWithShape="1">
+          <a:blip r:embed="rId2">
+            <a:extLst>
+              <a:ext uri="{28A0092B-C50C-407E-A947-70E740481C1C}">
+                <a14:useLocalDpi xmlns:a14="http://schemas.microsoft.com/office/drawing/2010/main" val="0"/>
+              </a:ext>
+            </a:extLst>
+          </a:blip>
+          <a:srcRect l="9617" t="5820" r="10094" b="65203"/>
+          <a:stretch/>
+        </p:blipFill>
+        <p:spPr bwMode="auto">
+          <a:xfrm>
+            <a:off x="1097280" y="2031240"/>
+            <a:ext cx="9256898" cy="4253650"/>
+          </a:xfrm>
+          <a:prstGeom prst="rect">
+            <a:avLst/>
+          </a:prstGeom>
+          <a:ln>
+            <a:noFill/>
+          </a:ln>
+          <a:extLst>
+            <a:ext uri="{53640926-AAD7-44D8-BBD7-CCE9431645EC}">
+              <a14:shadowObscured xmlns:a14="http://schemas.microsoft.com/office/drawing/2010/main"/>
+            </a:ext>
+          </a:extLst>
+        </p:spPr>
+      </p:pic>
     </p:spTree>
     <p:extLst>
       <p:ext uri="{BB962C8B-B14F-4D97-AF65-F5344CB8AC3E}">
-        <p14:creationId xmlns:p14="http://schemas.microsoft.com/office/powerpoint/2010/main" val="921941208"/>
+        <p14:creationId xmlns:p14="http://schemas.microsoft.com/office/powerpoint/2010/main" val="3594334776"/>
       </p:ext>
     </p:extLst>
   </p:cSld>
@@ -5101,6 +5223,96 @@
 </file>
 
 <file path=ppt/slides/slide6.xml><?xml version="1.0" encoding="utf-8"?>
+<p:sld xmlns:a="http://schemas.openxmlformats.org/drawingml/2006/main" xmlns:r="http://schemas.openxmlformats.org/officeDocument/2006/relationships" xmlns:p="http://schemas.openxmlformats.org/presentationml/2006/main">
+  <p:cSld>
+    <p:spTree>
+      <p:nvGrpSpPr>
+        <p:cNvPr id="1" name=""/>
+        <p:cNvGrpSpPr/>
+        <p:nvPr/>
+      </p:nvGrpSpPr>
+      <p:grpSpPr>
+        <a:xfrm>
+          <a:off x="0" y="0"/>
+          <a:ext cx="0" cy="0"/>
+          <a:chOff x="0" y="0"/>
+          <a:chExt cx="0" cy="0"/>
+        </a:xfrm>
+      </p:grpSpPr>
+      <p:sp>
+        <p:nvSpPr>
+          <p:cNvPr id="2" name="Title 1"/>
+          <p:cNvSpPr>
+            <a:spLocks noGrp="1"/>
+          </p:cNvSpPr>
+          <p:nvPr>
+            <p:ph type="title"/>
+          </p:nvPr>
+        </p:nvSpPr>
+        <p:spPr/>
+        <p:txBody>
+          <a:bodyPr/>
+          <a:lstStyle/>
+          <a:p>
+            <a:r>
+              <a:rPr lang="en-US" dirty="0" smtClean="0"/>
+              <a:t>UML Diagram </a:t>
+            </a:r>
+            <a:endParaRPr lang="en-US" dirty="0"/>
+          </a:p>
+        </p:txBody>
+      </p:sp>
+      <p:pic>
+        <p:nvPicPr>
+          <p:cNvPr id="3" name="Picture 2"/>
+          <p:cNvPicPr/>
+          <p:nvPr/>
+        </p:nvPicPr>
+        <p:blipFill>
+          <a:blip r:embed="rId2" cstate="print">
+            <a:extLst>
+              <a:ext uri="{28A0092B-C50C-407E-A947-70E740481C1C}">
+                <a14:useLocalDpi xmlns:a14="http://schemas.microsoft.com/office/drawing/2010/main" val="0"/>
+              </a:ext>
+            </a:extLst>
+          </a:blip>
+          <a:srcRect/>
+          <a:stretch>
+            <a:fillRect/>
+          </a:stretch>
+        </p:blipFill>
+        <p:spPr bwMode="auto">
+          <a:xfrm>
+            <a:off x="1226502" y="1864551"/>
+            <a:ext cx="9799955" cy="4391025"/>
+          </a:xfrm>
+          <a:prstGeom prst="rect">
+            <a:avLst/>
+          </a:prstGeom>
+          <a:noFill/>
+        </p:spPr>
+      </p:pic>
+    </p:spTree>
+    <p:extLst>
+      <p:ext uri="{BB962C8B-B14F-4D97-AF65-F5344CB8AC3E}">
+        <p14:creationId xmlns:p14="http://schemas.microsoft.com/office/powerpoint/2010/main" val="2802859205"/>
+      </p:ext>
+    </p:extLst>
+  </p:cSld>
+  <p:clrMapOvr>
+    <a:masterClrMapping/>
+  </p:clrMapOvr>
+  <p:timing>
+    <p:tnLst>
+      <p:par>
+        <p:cTn id="1" dur="indefinite" restart="never" nodeType="tmRoot"/>
+      </p:par>
+    </p:tnLst>
+  </p:timing>
+</p:sld>
+</file>
+
+<file path=ppt/slides/slide7.xml><?xml version="1.0" encoding="utf-8"?>
 <p:sld xmlns:a="http://schemas.openxmlformats.org/drawingml/2006/main" xmlns:r="http://schemas.openxmlformats.org/officeDocument/2006/relationships" xmlns:p="http://schemas.openxmlformats.org/presentationml/2006/main">
   <p:cSld>
     <p:spTree>
@@ -5206,7 +5418,7 @@
 </p:sld>
 </file>
 
-<file path=ppt/slides/slide7.xml><?xml version="1.0" encoding="utf-8"?>
+<file path=ppt/slides/slide8.xml><?xml version="1.0" encoding="utf-8"?>
 <p:sld xmlns:a="http://schemas.openxmlformats.org/drawingml/2006/main" xmlns:r="http://schemas.openxmlformats.org/officeDocument/2006/relationships" xmlns:p="http://schemas.openxmlformats.org/presentationml/2006/main">
   <p:cSld>
     <p:spTree>
@@ -5290,7 +5502,7 @@
 </p:sld>
 </file>
 
-<file path=ppt/slides/slide8.xml><?xml version="1.0" encoding="utf-8"?>
+<file path=ppt/slides/slide9.xml><?xml version="1.0" encoding="utf-8"?>
 <p:sld xmlns:a="http://schemas.openxmlformats.org/drawingml/2006/main" xmlns:r="http://schemas.openxmlformats.org/officeDocument/2006/relationships" xmlns:p="http://schemas.openxmlformats.org/presentationml/2006/main">
   <p:cSld>
     <p:spTree>
@@ -5375,88 +5587,6 @@
       </p:par>
     </p:tnLst>
   </p:timing>
-</p:sld>
-</file>
-
-<file path=ppt/slides/slide9.xml><?xml version="1.0" encoding="utf-8"?>
-<p:sld xmlns:a="http://schemas.openxmlformats.org/drawingml/2006/main" xmlns:r="http://schemas.openxmlformats.org/officeDocument/2006/relationships" xmlns:p="http://schemas.openxmlformats.org/presentationml/2006/main">
-  <p:cSld>
-    <p:spTree>
-      <p:nvGrpSpPr>
-        <p:cNvPr id="1" name=""/>
-        <p:cNvGrpSpPr/>
-        <p:nvPr/>
-      </p:nvGrpSpPr>
-      <p:grpSpPr>
-        <a:xfrm>
-          <a:off x="0" y="0"/>
-          <a:ext cx="0" cy="0"/>
-          <a:chOff x="0" y="0"/>
-          <a:chExt cx="0" cy="0"/>
-        </a:xfrm>
-      </p:grpSpPr>
-      <p:sp>
-        <p:nvSpPr>
-          <p:cNvPr id="2" name="Title 1"/>
-          <p:cNvSpPr>
-            <a:spLocks noGrp="1"/>
-          </p:cNvSpPr>
-          <p:nvPr>
-            <p:ph type="title"/>
-          </p:nvPr>
-        </p:nvSpPr>
-        <p:spPr/>
-        <p:txBody>
-          <a:bodyPr/>
-          <a:lstStyle/>
-          <a:p>
-            <a:r>
-              <a:rPr lang="en-US" altLang="zh-CN" dirty="0" smtClean="0"/>
-              <a:t>Density</a:t>
-            </a:r>
-            <a:endParaRPr lang="en-US" dirty="0"/>
-          </a:p>
-        </p:txBody>
-      </p:sp>
-      <p:pic>
-        <p:nvPicPr>
-          <p:cNvPr id="4" name="Content Placeholder 3"/>
-          <p:cNvPicPr>
-            <a:picLocks noGrp="1" noChangeAspect="1"/>
-          </p:cNvPicPr>
-          <p:nvPr>
-            <p:ph idx="1"/>
-          </p:nvPr>
-        </p:nvPicPr>
-        <p:blipFill>
-          <a:blip r:embed="rId2">
-            <a:extLst>
-              <a:ext uri="{28A0092B-C50C-407E-A947-70E740481C1C}">
-                <a14:useLocalDpi xmlns:a14="http://schemas.microsoft.com/office/drawing/2010/main" val="0"/>
-              </a:ext>
-            </a:extLst>
-          </a:blip>
-          <a:stretch>
-            <a:fillRect/>
-          </a:stretch>
-        </p:blipFill>
-        <p:spPr>
-          <a:xfrm>
-            <a:off x="4778187" y="2238149"/>
-            <a:ext cx="2695951" cy="3238952"/>
-          </a:xfrm>
-        </p:spPr>
-      </p:pic>
-    </p:spTree>
-    <p:extLst>
-      <p:ext uri="{BB962C8B-B14F-4D97-AF65-F5344CB8AC3E}">
-        <p14:creationId xmlns:p14="http://schemas.microsoft.com/office/powerpoint/2010/main" val="3922382855"/>
-      </p:ext>
-    </p:extLst>
-  </p:cSld>
-  <p:clrMapOvr>
-    <a:masterClrMapping/>
-  </p:clrMapOvr>
 </p:sld>
 </file>
 

</xml_diff>